<commit_message>
added multibamqc PCA formatting code and output
</commit_message>
<xml_diff>
--- a/analyses/Coverage_analysis/Genome_CpG_coverage_analysis.pptx
+++ b/analyses/Coverage_analysis/Genome_CpG_coverage_analysis.pptx
@@ -6,6 +6,7 @@
   </p:sldMasterIdLst>
   <p:sldIdLst>
     <p:sldId id="256" r:id="rId2"/>
+    <p:sldId id="257" r:id="rId3"/>
   </p:sldIdLst>
   <p:sldSz cx="12192000" cy="6858000"/>
   <p:notesSz cx="6858000" cy="9144000"/>
@@ -4044,6 +4045,269 @@
 </p:sld>
 </file>
 
+<file path=ppt/slides/slide2.xml><?xml version="1.0" encoding="utf-8"?>
+<p:sld xmlns:a="http://schemas.openxmlformats.org/drawingml/2006/main" xmlns:r="http://schemas.openxmlformats.org/officeDocument/2006/relationships" xmlns:p="http://schemas.openxmlformats.org/presentationml/2006/main">
+  <p:cSld>
+    <p:spTree>
+      <p:nvGrpSpPr>
+        <p:cNvPr id="1" name=""/>
+        <p:cNvGrpSpPr/>
+        <p:nvPr/>
+      </p:nvGrpSpPr>
+      <p:grpSpPr>
+        <a:xfrm>
+          <a:off x="0" y="0"/>
+          <a:ext cx="0" cy="0"/>
+          <a:chOff x="0" y="0"/>
+          <a:chExt cx="0" cy="0"/>
+        </a:xfrm>
+      </p:grpSpPr>
+      <p:pic>
+        <p:nvPicPr>
+          <p:cNvPr id="9" name="Picture 8">
+            <a:extLst>
+              <a:ext uri="{FF2B5EF4-FFF2-40B4-BE49-F238E27FC236}">
+                <a16:creationId xmlns:a16="http://schemas.microsoft.com/office/drawing/2014/main" id="{54D743E6-6D12-1A4E-B03C-12AA63673EC6}"/>
+              </a:ext>
+            </a:extLst>
+          </p:cNvPr>
+          <p:cNvPicPr>
+            <a:picLocks noChangeAspect="1"/>
+          </p:cNvPicPr>
+          <p:nvPr/>
+        </p:nvPicPr>
+        <p:blipFill>
+          <a:blip r:embed="rId2"/>
+          <a:stretch>
+            <a:fillRect/>
+          </a:stretch>
+        </p:blipFill>
+        <p:spPr>
+          <a:xfrm>
+            <a:off x="5862320" y="558800"/>
+            <a:ext cx="6329680" cy="4521201"/>
+          </a:xfrm>
+          <a:prstGeom prst="rect">
+            <a:avLst/>
+          </a:prstGeom>
+        </p:spPr>
+      </p:pic>
+      <p:pic>
+        <p:nvPicPr>
+          <p:cNvPr id="11" name="Picture 10" descr="A picture containing photo, sitting, lot, table&#10;&#10;Description automatically generated">
+            <a:extLst>
+              <a:ext uri="{FF2B5EF4-FFF2-40B4-BE49-F238E27FC236}">
+                <a16:creationId xmlns:a16="http://schemas.microsoft.com/office/drawing/2014/main" id="{A43BF0A1-DD09-2647-A1C5-1F99AF5E807F}"/>
+              </a:ext>
+            </a:extLst>
+          </p:cNvPr>
+          <p:cNvPicPr>
+            <a:picLocks noChangeAspect="1"/>
+          </p:cNvPicPr>
+          <p:nvPr/>
+        </p:nvPicPr>
+        <p:blipFill rotWithShape="1">
+          <a:blip r:embed="rId3"/>
+          <a:srcRect r="14439"/>
+          <a:stretch/>
+        </p:blipFill>
+        <p:spPr>
+          <a:xfrm>
+            <a:off x="152400" y="558801"/>
+            <a:ext cx="5415769" cy="4521200"/>
+          </a:xfrm>
+          <a:prstGeom prst="rect">
+            <a:avLst/>
+          </a:prstGeom>
+        </p:spPr>
+      </p:pic>
+      <p:sp>
+        <p:nvSpPr>
+          <p:cNvPr id="12" name="TextBox 11">
+            <a:extLst>
+              <a:ext uri="{FF2B5EF4-FFF2-40B4-BE49-F238E27FC236}">
+                <a16:creationId xmlns:a16="http://schemas.microsoft.com/office/drawing/2014/main" id="{BCF59BB4-0DAF-DB4E-90C0-5564503BEE8C}"/>
+              </a:ext>
+            </a:extLst>
+          </p:cNvPr>
+          <p:cNvSpPr txBox="1"/>
+          <p:nvPr/>
+        </p:nvSpPr>
+        <p:spPr>
+          <a:xfrm>
+            <a:off x="152400" y="45783"/>
+            <a:ext cx="332142" cy="338554"/>
+          </a:xfrm>
+          <a:prstGeom prst="rect">
+            <a:avLst/>
+          </a:prstGeom>
+          <a:noFill/>
+        </p:spPr>
+        <p:txBody>
+          <a:bodyPr wrap="none" rtlCol="0">
+            <a:spAutoFit/>
+          </a:bodyPr>
+          <a:lstStyle/>
+          <a:p>
+            <a:r>
+              <a:rPr lang="en-US" sz="1600" b="1" dirty="0">
+                <a:latin typeface="Arial" panose="020B0604020202020204" pitchFamily="34" charset="0"/>
+                <a:cs typeface="Arial" panose="020B0604020202020204" pitchFamily="34" charset="0"/>
+              </a:rPr>
+              <a:t>A</a:t>
+            </a:r>
+          </a:p>
+        </p:txBody>
+      </p:sp>
+      <p:sp>
+        <p:nvSpPr>
+          <p:cNvPr id="13" name="TextBox 12">
+            <a:extLst>
+              <a:ext uri="{FF2B5EF4-FFF2-40B4-BE49-F238E27FC236}">
+                <a16:creationId xmlns:a16="http://schemas.microsoft.com/office/drawing/2014/main" id="{D612037F-6527-AE44-B4CE-A5A078FFDE87}"/>
+              </a:ext>
+            </a:extLst>
+          </p:cNvPr>
+          <p:cNvSpPr txBox="1"/>
+          <p:nvPr/>
+        </p:nvSpPr>
+        <p:spPr>
+          <a:xfrm>
+            <a:off x="5862320" y="45783"/>
+            <a:ext cx="332142" cy="338554"/>
+          </a:xfrm>
+          <a:prstGeom prst="rect">
+            <a:avLst/>
+          </a:prstGeom>
+          <a:noFill/>
+        </p:spPr>
+        <p:txBody>
+          <a:bodyPr wrap="none" rtlCol="0">
+            <a:spAutoFit/>
+          </a:bodyPr>
+          <a:lstStyle/>
+          <a:p>
+            <a:r>
+              <a:rPr lang="en-US" sz="1600" b="1" dirty="0">
+                <a:latin typeface="Arial" panose="020B0604020202020204" pitchFamily="34" charset="0"/>
+                <a:cs typeface="Arial" panose="020B0604020202020204" pitchFamily="34" charset="0"/>
+              </a:rPr>
+              <a:t>B</a:t>
+            </a:r>
+          </a:p>
+        </p:txBody>
+      </p:sp>
+      <p:sp>
+        <p:nvSpPr>
+          <p:cNvPr id="14" name="TextBox 13">
+            <a:extLst>
+              <a:ext uri="{FF2B5EF4-FFF2-40B4-BE49-F238E27FC236}">
+                <a16:creationId xmlns:a16="http://schemas.microsoft.com/office/drawing/2014/main" id="{34E61162-7241-BE40-8182-90490B2A3C00}"/>
+              </a:ext>
+            </a:extLst>
+          </p:cNvPr>
+          <p:cNvSpPr txBox="1"/>
+          <p:nvPr/>
+        </p:nvSpPr>
+        <p:spPr>
+          <a:xfrm>
+            <a:off x="610482" y="333070"/>
+            <a:ext cx="936475" cy="276999"/>
+          </a:xfrm>
+          <a:prstGeom prst="rect">
+            <a:avLst/>
+          </a:prstGeom>
+          <a:noFill/>
+        </p:spPr>
+        <p:txBody>
+          <a:bodyPr wrap="none" rtlCol="0">
+            <a:spAutoFit/>
+          </a:bodyPr>
+          <a:lstStyle/>
+          <a:p>
+            <a:r>
+              <a:rPr lang="en-US" sz="1200" i="1" dirty="0">
+                <a:latin typeface="Arial" panose="020B0604020202020204" pitchFamily="34" charset="0"/>
+                <a:cs typeface="Arial" panose="020B0604020202020204" pitchFamily="34" charset="0"/>
+              </a:rPr>
+              <a:t>M. </a:t>
+            </a:r>
+            <a:r>
+              <a:rPr lang="en-US" sz="1200" i="1" dirty="0" err="1">
+                <a:latin typeface="Arial" panose="020B0604020202020204" pitchFamily="34" charset="0"/>
+                <a:cs typeface="Arial" panose="020B0604020202020204" pitchFamily="34" charset="0"/>
+              </a:rPr>
+              <a:t>capitata</a:t>
+            </a:r>
+            <a:endParaRPr lang="en-US" sz="1200" i="1" dirty="0">
+              <a:latin typeface="Arial" panose="020B0604020202020204" pitchFamily="34" charset="0"/>
+              <a:cs typeface="Arial" panose="020B0604020202020204" pitchFamily="34" charset="0"/>
+            </a:endParaRPr>
+          </a:p>
+        </p:txBody>
+      </p:sp>
+      <p:sp>
+        <p:nvSpPr>
+          <p:cNvPr id="15" name="TextBox 14">
+            <a:extLst>
+              <a:ext uri="{FF2B5EF4-FFF2-40B4-BE49-F238E27FC236}">
+                <a16:creationId xmlns:a16="http://schemas.microsoft.com/office/drawing/2014/main" id="{C919CE60-8A83-2D4D-8D1B-2F9A52DA79BA}"/>
+              </a:ext>
+            </a:extLst>
+          </p:cNvPr>
+          <p:cNvSpPr txBox="1"/>
+          <p:nvPr/>
+        </p:nvSpPr>
+        <p:spPr>
+          <a:xfrm>
+            <a:off x="6448952" y="333069"/>
+            <a:ext cx="729110" cy="276999"/>
+          </a:xfrm>
+          <a:prstGeom prst="rect">
+            <a:avLst/>
+          </a:prstGeom>
+          <a:noFill/>
+        </p:spPr>
+        <p:txBody>
+          <a:bodyPr wrap="none" rtlCol="0">
+            <a:spAutoFit/>
+          </a:bodyPr>
+          <a:lstStyle/>
+          <a:p>
+            <a:r>
+              <a:rPr lang="en-US" sz="1200" i="1" dirty="0">
+                <a:latin typeface="Arial" panose="020B0604020202020204" pitchFamily="34" charset="0"/>
+                <a:cs typeface="Arial" panose="020B0604020202020204" pitchFamily="34" charset="0"/>
+              </a:rPr>
+              <a:t>P. </a:t>
+            </a:r>
+            <a:r>
+              <a:rPr lang="en-US" sz="1200" i="1" dirty="0" err="1">
+                <a:latin typeface="Arial" panose="020B0604020202020204" pitchFamily="34" charset="0"/>
+                <a:cs typeface="Arial" panose="020B0604020202020204" pitchFamily="34" charset="0"/>
+              </a:rPr>
+              <a:t>acuta</a:t>
+            </a:r>
+            <a:endParaRPr lang="en-US" sz="1200" i="1" dirty="0">
+              <a:latin typeface="Arial" panose="020B0604020202020204" pitchFamily="34" charset="0"/>
+              <a:cs typeface="Arial" panose="020B0604020202020204" pitchFamily="34" charset="0"/>
+            </a:endParaRPr>
+          </a:p>
+        </p:txBody>
+      </p:sp>
+    </p:spTree>
+    <p:extLst>
+      <p:ext uri="{BB962C8B-B14F-4D97-AF65-F5344CB8AC3E}">
+        <p14:creationId xmlns:p14="http://schemas.microsoft.com/office/powerpoint/2010/main" val="2514897300"/>
+      </p:ext>
+    </p:extLst>
+  </p:cSld>
+  <p:clrMapOvr>
+    <a:masterClrMapping/>
+  </p:clrMapOvr>
+</p:sld>
+</file>
+
 <file path=ppt/theme/theme1.xml><?xml version="1.0" encoding="utf-8"?>
 <a:theme xmlns:a="http://schemas.openxmlformats.org/drawingml/2006/main" name="Office Theme">
   <a:themeElements>

</xml_diff>

<commit_message>
added genome coverage supp fig
</commit_message>
<xml_diff>
--- a/analyses/Coverage_analysis/Genome_CpG_coverage_analysis.pptx
+++ b/analyses/Coverage_analysis/Genome_CpG_coverage_analysis.pptx
@@ -6,7 +6,8 @@
   </p:sldMasterIdLst>
   <p:sldIdLst>
     <p:sldId id="256" r:id="rId2"/>
-    <p:sldId id="257" r:id="rId3"/>
+    <p:sldId id="258" r:id="rId3"/>
+    <p:sldId id="257" r:id="rId4"/>
   </p:sldIdLst>
   <p:sldSz cx="12192000" cy="6858000"/>
   <p:notesSz cx="6858000" cy="9144000"/>
@@ -108,12 +109,12 @@
   <p:extLst>
     <p:ext uri="{EFAFB233-063F-42B5-8137-9DF3F51BA10A}">
       <p15:sldGuideLst xmlns:p15="http://schemas.microsoft.com/office/powerpoint/2012/main">
-        <p15:guide id="1" orient="horz" pos="1008" userDrawn="1">
+        <p15:guide id="1" orient="horz" pos="2496" userDrawn="1">
           <p15:clr>
             <a:srgbClr val="A4A3A4"/>
           </p15:clr>
         </p15:guide>
-        <p15:guide id="2" pos="2136" userDrawn="1">
+        <p15:guide id="2" pos="216" userDrawn="1">
           <p15:clr>
             <a:srgbClr val="A4A3A4"/>
           </p15:clr>
@@ -4064,6 +4065,730 @@
       </p:grpSpPr>
       <p:pic>
         <p:nvPicPr>
+          <p:cNvPr id="32" name="Picture 31" descr="A picture containing clock&#10;&#10;Description automatically generated">
+            <a:extLst>
+              <a:ext uri="{FF2B5EF4-FFF2-40B4-BE49-F238E27FC236}">
+                <a16:creationId xmlns:a16="http://schemas.microsoft.com/office/drawing/2014/main" id="{E6401F7E-2BF0-2F4E-A468-429B64B23DAB}"/>
+              </a:ext>
+            </a:extLst>
+          </p:cNvPr>
+          <p:cNvPicPr>
+            <a:picLocks noChangeAspect="1"/>
+          </p:cNvPicPr>
+          <p:nvPr/>
+        </p:nvPicPr>
+        <p:blipFill>
+          <a:blip r:embed="rId2"/>
+          <a:stretch>
+            <a:fillRect/>
+          </a:stretch>
+        </p:blipFill>
+        <p:spPr>
+          <a:xfrm>
+            <a:off x="3376262" y="332199"/>
+            <a:ext cx="4620122" cy="1491093"/>
+          </a:xfrm>
+          <a:prstGeom prst="rect">
+            <a:avLst/>
+          </a:prstGeom>
+        </p:spPr>
+      </p:pic>
+      <p:pic>
+        <p:nvPicPr>
+          <p:cNvPr id="29" name="Picture 28" descr="A close up of a piece of paper&#10;&#10;Description automatically generated">
+            <a:extLst>
+              <a:ext uri="{FF2B5EF4-FFF2-40B4-BE49-F238E27FC236}">
+                <a16:creationId xmlns:a16="http://schemas.microsoft.com/office/drawing/2014/main" id="{A7A9243F-7992-0343-9958-B779FB3C6B7A}"/>
+              </a:ext>
+            </a:extLst>
+          </p:cNvPr>
+          <p:cNvPicPr>
+            <a:picLocks noChangeAspect="1"/>
+          </p:cNvPicPr>
+          <p:nvPr/>
+        </p:nvPicPr>
+        <p:blipFill>
+          <a:blip r:embed="rId3"/>
+          <a:stretch>
+            <a:fillRect/>
+          </a:stretch>
+        </p:blipFill>
+        <p:spPr>
+          <a:xfrm>
+            <a:off x="1119057" y="2386632"/>
+            <a:ext cx="2096143" cy="1397428"/>
+          </a:xfrm>
+          <a:prstGeom prst="rect">
+            <a:avLst/>
+          </a:prstGeom>
+        </p:spPr>
+      </p:pic>
+      <p:pic>
+        <p:nvPicPr>
+          <p:cNvPr id="28" name="Picture 27" descr="A screenshot of a cell phone&#10;&#10;Description automatically generated">
+            <a:extLst>
+              <a:ext uri="{FF2B5EF4-FFF2-40B4-BE49-F238E27FC236}">
+                <a16:creationId xmlns:a16="http://schemas.microsoft.com/office/drawing/2014/main" id="{B246D3EF-6A04-3E43-973B-8E461A4D29A0}"/>
+              </a:ext>
+            </a:extLst>
+          </p:cNvPr>
+          <p:cNvPicPr>
+            <a:picLocks noChangeAspect="1"/>
+          </p:cNvPicPr>
+          <p:nvPr/>
+        </p:nvPicPr>
+        <p:blipFill>
+          <a:blip r:embed="rId4"/>
+          <a:stretch>
+            <a:fillRect/>
+          </a:stretch>
+        </p:blipFill>
+        <p:spPr>
+          <a:xfrm>
+            <a:off x="3438400" y="2324034"/>
+            <a:ext cx="4620121" cy="1491093"/>
+          </a:xfrm>
+          <a:prstGeom prst="rect">
+            <a:avLst/>
+          </a:prstGeom>
+        </p:spPr>
+      </p:pic>
+      <p:sp>
+        <p:nvSpPr>
+          <p:cNvPr id="4" name="TextBox 3">
+            <a:extLst>
+              <a:ext uri="{FF2B5EF4-FFF2-40B4-BE49-F238E27FC236}">
+                <a16:creationId xmlns:a16="http://schemas.microsoft.com/office/drawing/2014/main" id="{19A58654-40C5-E84F-BFDD-1764935ABB91}"/>
+              </a:ext>
+            </a:extLst>
+          </p:cNvPr>
+          <p:cNvSpPr txBox="1"/>
+          <p:nvPr/>
+        </p:nvSpPr>
+        <p:spPr>
+          <a:xfrm rot="16200000">
+            <a:off x="242182" y="838373"/>
+            <a:ext cx="936475" cy="276999"/>
+          </a:xfrm>
+          <a:prstGeom prst="rect">
+            <a:avLst/>
+          </a:prstGeom>
+          <a:noFill/>
+        </p:spPr>
+        <p:txBody>
+          <a:bodyPr wrap="none" rtlCol="0">
+            <a:spAutoFit/>
+          </a:bodyPr>
+          <a:lstStyle/>
+          <a:p>
+            <a:r>
+              <a:rPr lang="en-US" sz="1200" i="1" dirty="0">
+                <a:latin typeface="Arial" panose="020B0604020202020204" pitchFamily="34" charset="0"/>
+                <a:cs typeface="Arial" panose="020B0604020202020204" pitchFamily="34" charset="0"/>
+              </a:rPr>
+              <a:t>M. </a:t>
+            </a:r>
+            <a:r>
+              <a:rPr lang="en-US" sz="1200" i="1" dirty="0" err="1">
+                <a:latin typeface="Arial" panose="020B0604020202020204" pitchFamily="34" charset="0"/>
+                <a:cs typeface="Arial" panose="020B0604020202020204" pitchFamily="34" charset="0"/>
+              </a:rPr>
+              <a:t>capitata</a:t>
+            </a:r>
+            <a:endParaRPr lang="en-US" sz="1200" i="1" dirty="0">
+              <a:latin typeface="Arial" panose="020B0604020202020204" pitchFamily="34" charset="0"/>
+              <a:cs typeface="Arial" panose="020B0604020202020204" pitchFamily="34" charset="0"/>
+            </a:endParaRPr>
+          </a:p>
+        </p:txBody>
+      </p:sp>
+      <p:sp>
+        <p:nvSpPr>
+          <p:cNvPr id="5" name="TextBox 4">
+            <a:extLst>
+              <a:ext uri="{FF2B5EF4-FFF2-40B4-BE49-F238E27FC236}">
+                <a16:creationId xmlns:a16="http://schemas.microsoft.com/office/drawing/2014/main" id="{1755ACE4-2B09-ED4F-A4A4-DA421FF8BB39}"/>
+              </a:ext>
+            </a:extLst>
+          </p:cNvPr>
+          <p:cNvSpPr txBox="1"/>
+          <p:nvPr/>
+        </p:nvSpPr>
+        <p:spPr>
+          <a:xfrm rot="16200000">
+            <a:off x="345084" y="2894586"/>
+            <a:ext cx="729110" cy="276999"/>
+          </a:xfrm>
+          <a:prstGeom prst="rect">
+            <a:avLst/>
+          </a:prstGeom>
+          <a:noFill/>
+        </p:spPr>
+        <p:txBody>
+          <a:bodyPr wrap="none" rtlCol="0">
+            <a:spAutoFit/>
+          </a:bodyPr>
+          <a:lstStyle/>
+          <a:p>
+            <a:r>
+              <a:rPr lang="en-US" sz="1200" i="1" dirty="0">
+                <a:latin typeface="Arial" panose="020B0604020202020204" pitchFamily="34" charset="0"/>
+                <a:cs typeface="Arial" panose="020B0604020202020204" pitchFamily="34" charset="0"/>
+              </a:rPr>
+              <a:t>P. </a:t>
+            </a:r>
+            <a:r>
+              <a:rPr lang="en-US" sz="1200" i="1" dirty="0" err="1">
+                <a:latin typeface="Arial" panose="020B0604020202020204" pitchFamily="34" charset="0"/>
+                <a:cs typeface="Arial" panose="020B0604020202020204" pitchFamily="34" charset="0"/>
+              </a:rPr>
+              <a:t>acuta</a:t>
+            </a:r>
+            <a:endParaRPr lang="en-US" sz="1200" i="1" dirty="0">
+              <a:latin typeface="Arial" panose="020B0604020202020204" pitchFamily="34" charset="0"/>
+              <a:cs typeface="Arial" panose="020B0604020202020204" pitchFamily="34" charset="0"/>
+            </a:endParaRPr>
+          </a:p>
+        </p:txBody>
+      </p:sp>
+      <p:sp>
+        <p:nvSpPr>
+          <p:cNvPr id="10" name="TextBox 9">
+            <a:extLst>
+              <a:ext uri="{FF2B5EF4-FFF2-40B4-BE49-F238E27FC236}">
+                <a16:creationId xmlns:a16="http://schemas.microsoft.com/office/drawing/2014/main" id="{D7048156-AA6D-9E44-9B17-FAE4A213798D}"/>
+              </a:ext>
+            </a:extLst>
+          </p:cNvPr>
+          <p:cNvSpPr txBox="1"/>
+          <p:nvPr/>
+        </p:nvSpPr>
+        <p:spPr>
+          <a:xfrm>
+            <a:off x="942846" y="45783"/>
+            <a:ext cx="332142" cy="338554"/>
+          </a:xfrm>
+          <a:prstGeom prst="rect">
+            <a:avLst/>
+          </a:prstGeom>
+          <a:noFill/>
+        </p:spPr>
+        <p:txBody>
+          <a:bodyPr wrap="none" rtlCol="0">
+            <a:spAutoFit/>
+          </a:bodyPr>
+          <a:lstStyle/>
+          <a:p>
+            <a:r>
+              <a:rPr lang="en-US" sz="1600" b="1" dirty="0">
+                <a:latin typeface="Arial" panose="020B0604020202020204" pitchFamily="34" charset="0"/>
+                <a:cs typeface="Arial" panose="020B0604020202020204" pitchFamily="34" charset="0"/>
+              </a:rPr>
+              <a:t>A</a:t>
+            </a:r>
+          </a:p>
+        </p:txBody>
+      </p:sp>
+      <p:sp>
+        <p:nvSpPr>
+          <p:cNvPr id="11" name="TextBox 10">
+            <a:extLst>
+              <a:ext uri="{FF2B5EF4-FFF2-40B4-BE49-F238E27FC236}">
+                <a16:creationId xmlns:a16="http://schemas.microsoft.com/office/drawing/2014/main" id="{B09DB2BC-B784-F744-91A1-50B789F6BB53}"/>
+              </a:ext>
+            </a:extLst>
+          </p:cNvPr>
+          <p:cNvSpPr txBox="1"/>
+          <p:nvPr/>
+        </p:nvSpPr>
+        <p:spPr>
+          <a:xfrm>
+            <a:off x="3235089" y="45783"/>
+            <a:ext cx="332142" cy="338554"/>
+          </a:xfrm>
+          <a:prstGeom prst="rect">
+            <a:avLst/>
+          </a:prstGeom>
+          <a:noFill/>
+        </p:spPr>
+        <p:txBody>
+          <a:bodyPr wrap="none" rtlCol="0">
+            <a:spAutoFit/>
+          </a:bodyPr>
+          <a:lstStyle/>
+          <a:p>
+            <a:r>
+              <a:rPr lang="en-US" sz="1600" b="1" dirty="0">
+                <a:latin typeface="Arial" panose="020B0604020202020204" pitchFamily="34" charset="0"/>
+                <a:cs typeface="Arial" panose="020B0604020202020204" pitchFamily="34" charset="0"/>
+              </a:rPr>
+              <a:t>B</a:t>
+            </a:r>
+          </a:p>
+        </p:txBody>
+      </p:sp>
+      <p:sp>
+        <p:nvSpPr>
+          <p:cNvPr id="12" name="TextBox 11">
+            <a:extLst>
+              <a:ext uri="{FF2B5EF4-FFF2-40B4-BE49-F238E27FC236}">
+                <a16:creationId xmlns:a16="http://schemas.microsoft.com/office/drawing/2014/main" id="{F014E614-9BBD-9949-88E0-809DF203256D}"/>
+              </a:ext>
+            </a:extLst>
+          </p:cNvPr>
+          <p:cNvSpPr txBox="1"/>
+          <p:nvPr/>
+        </p:nvSpPr>
+        <p:spPr>
+          <a:xfrm>
+            <a:off x="942846" y="2107071"/>
+            <a:ext cx="332142" cy="338554"/>
+          </a:xfrm>
+          <a:prstGeom prst="rect">
+            <a:avLst/>
+          </a:prstGeom>
+          <a:noFill/>
+        </p:spPr>
+        <p:txBody>
+          <a:bodyPr wrap="none" rtlCol="0">
+            <a:spAutoFit/>
+          </a:bodyPr>
+          <a:lstStyle/>
+          <a:p>
+            <a:r>
+              <a:rPr lang="en-US" sz="1600" b="1" dirty="0">
+                <a:latin typeface="Arial" panose="020B0604020202020204" pitchFamily="34" charset="0"/>
+                <a:cs typeface="Arial" panose="020B0604020202020204" pitchFamily="34" charset="0"/>
+              </a:rPr>
+              <a:t>C</a:t>
+            </a:r>
+          </a:p>
+        </p:txBody>
+      </p:sp>
+      <p:sp>
+        <p:nvSpPr>
+          <p:cNvPr id="13" name="TextBox 12">
+            <a:extLst>
+              <a:ext uri="{FF2B5EF4-FFF2-40B4-BE49-F238E27FC236}">
+                <a16:creationId xmlns:a16="http://schemas.microsoft.com/office/drawing/2014/main" id="{919C5676-4D1D-5140-B4B6-FCFBF69C0324}"/>
+              </a:ext>
+            </a:extLst>
+          </p:cNvPr>
+          <p:cNvSpPr txBox="1"/>
+          <p:nvPr/>
+        </p:nvSpPr>
+        <p:spPr>
+          <a:xfrm>
+            <a:off x="3235089" y="2107071"/>
+            <a:ext cx="332142" cy="338554"/>
+          </a:xfrm>
+          <a:prstGeom prst="rect">
+            <a:avLst/>
+          </a:prstGeom>
+          <a:noFill/>
+        </p:spPr>
+        <p:txBody>
+          <a:bodyPr wrap="none" rtlCol="0">
+            <a:spAutoFit/>
+          </a:bodyPr>
+          <a:lstStyle/>
+          <a:p>
+            <a:r>
+              <a:rPr lang="en-US" sz="1600" b="1" dirty="0">
+                <a:latin typeface="Arial" panose="020B0604020202020204" pitchFamily="34" charset="0"/>
+                <a:cs typeface="Arial" panose="020B0604020202020204" pitchFamily="34" charset="0"/>
+              </a:rPr>
+              <a:t>D</a:t>
+            </a:r>
+          </a:p>
+        </p:txBody>
+      </p:sp>
+      <p:sp>
+        <p:nvSpPr>
+          <p:cNvPr id="14" name="Rectangle 13">
+            <a:extLst>
+              <a:ext uri="{FF2B5EF4-FFF2-40B4-BE49-F238E27FC236}">
+                <a16:creationId xmlns:a16="http://schemas.microsoft.com/office/drawing/2014/main" id="{5D78E2B7-555A-CB4F-A738-779A84CCF4DD}"/>
+              </a:ext>
+            </a:extLst>
+          </p:cNvPr>
+          <p:cNvSpPr/>
+          <p:nvPr/>
+        </p:nvSpPr>
+        <p:spPr>
+          <a:xfrm>
+            <a:off x="5927725" y="371475"/>
+            <a:ext cx="1065029" cy="137160"/>
+          </a:xfrm>
+          <a:prstGeom prst="rect">
+            <a:avLst/>
+          </a:prstGeom>
+          <a:solidFill>
+            <a:srgbClr val="34A352">
+              <a:alpha val="40000"/>
+            </a:srgbClr>
+          </a:solidFill>
+          <a:ln>
+            <a:noFill/>
+          </a:ln>
+        </p:spPr>
+        <p:style>
+          <a:lnRef idx="2">
+            <a:schemeClr val="accent1">
+              <a:shade val="50000"/>
+            </a:schemeClr>
+          </a:lnRef>
+          <a:fillRef idx="1">
+            <a:schemeClr val="accent1"/>
+          </a:fillRef>
+          <a:effectRef idx="0">
+            <a:schemeClr val="accent1"/>
+          </a:effectRef>
+          <a:fontRef idx="minor">
+            <a:schemeClr val="lt1"/>
+          </a:fontRef>
+        </p:style>
+        <p:txBody>
+          <a:bodyPr rtlCol="0" anchor="ctr"/>
+          <a:lstStyle/>
+          <a:p>
+            <a:pPr algn="ctr"/>
+            <a:endParaRPr lang="en-US"/>
+          </a:p>
+        </p:txBody>
+      </p:sp>
+      <p:sp>
+        <p:nvSpPr>
+          <p:cNvPr id="15" name="Rectangle 14">
+            <a:extLst>
+              <a:ext uri="{FF2B5EF4-FFF2-40B4-BE49-F238E27FC236}">
+                <a16:creationId xmlns:a16="http://schemas.microsoft.com/office/drawing/2014/main" id="{3953DCF0-3ABF-2148-9812-D907442A4436}"/>
+              </a:ext>
+            </a:extLst>
+          </p:cNvPr>
+          <p:cNvSpPr/>
+          <p:nvPr/>
+        </p:nvSpPr>
+        <p:spPr>
+          <a:xfrm>
+            <a:off x="5988504" y="2368668"/>
+            <a:ext cx="1065029" cy="137160"/>
+          </a:xfrm>
+          <a:prstGeom prst="rect">
+            <a:avLst/>
+          </a:prstGeom>
+          <a:solidFill>
+            <a:srgbClr val="34A352">
+              <a:alpha val="40000"/>
+            </a:srgbClr>
+          </a:solidFill>
+          <a:ln>
+            <a:noFill/>
+          </a:ln>
+        </p:spPr>
+        <p:style>
+          <a:lnRef idx="2">
+            <a:schemeClr val="accent1">
+              <a:shade val="50000"/>
+            </a:schemeClr>
+          </a:lnRef>
+          <a:fillRef idx="1">
+            <a:schemeClr val="accent1"/>
+          </a:fillRef>
+          <a:effectRef idx="0">
+            <a:schemeClr val="accent1"/>
+          </a:effectRef>
+          <a:fontRef idx="minor">
+            <a:schemeClr val="lt1"/>
+          </a:fontRef>
+        </p:style>
+        <p:txBody>
+          <a:bodyPr rtlCol="0" anchor="ctr"/>
+          <a:lstStyle/>
+          <a:p>
+            <a:pPr algn="ctr"/>
+            <a:endParaRPr lang="en-US"/>
+          </a:p>
+        </p:txBody>
+      </p:sp>
+      <p:sp>
+        <p:nvSpPr>
+          <p:cNvPr id="18" name="Rectangle 17">
+            <a:extLst>
+              <a:ext uri="{FF2B5EF4-FFF2-40B4-BE49-F238E27FC236}">
+                <a16:creationId xmlns:a16="http://schemas.microsoft.com/office/drawing/2014/main" id="{AF62702F-7816-B645-9BAC-342F70924B3D}"/>
+              </a:ext>
+            </a:extLst>
+          </p:cNvPr>
+          <p:cNvSpPr/>
+          <p:nvPr/>
+        </p:nvSpPr>
+        <p:spPr>
+          <a:xfrm>
+            <a:off x="4816159" y="371475"/>
+            <a:ext cx="1065029" cy="137160"/>
+          </a:xfrm>
+          <a:prstGeom prst="rect">
+            <a:avLst/>
+          </a:prstGeom>
+          <a:solidFill>
+            <a:srgbClr val="746AAE">
+              <a:alpha val="40000"/>
+            </a:srgbClr>
+          </a:solidFill>
+          <a:ln>
+            <a:noFill/>
+          </a:ln>
+        </p:spPr>
+        <p:style>
+          <a:lnRef idx="2">
+            <a:schemeClr val="accent1">
+              <a:shade val="50000"/>
+            </a:schemeClr>
+          </a:lnRef>
+          <a:fillRef idx="1">
+            <a:schemeClr val="accent1"/>
+          </a:fillRef>
+          <a:effectRef idx="0">
+            <a:schemeClr val="accent1"/>
+          </a:effectRef>
+          <a:fontRef idx="minor">
+            <a:schemeClr val="lt1"/>
+          </a:fontRef>
+        </p:style>
+        <p:txBody>
+          <a:bodyPr rtlCol="0" anchor="ctr"/>
+          <a:lstStyle/>
+          <a:p>
+            <a:pPr algn="ctr"/>
+            <a:endParaRPr lang="en-US"/>
+          </a:p>
+        </p:txBody>
+      </p:sp>
+      <p:sp>
+        <p:nvSpPr>
+          <p:cNvPr id="19" name="Rectangle 18">
+            <a:extLst>
+              <a:ext uri="{FF2B5EF4-FFF2-40B4-BE49-F238E27FC236}">
+                <a16:creationId xmlns:a16="http://schemas.microsoft.com/office/drawing/2014/main" id="{854CAE64-477D-2341-BE39-B48554ABA47B}"/>
+              </a:ext>
+            </a:extLst>
+          </p:cNvPr>
+          <p:cNvSpPr/>
+          <p:nvPr/>
+        </p:nvSpPr>
+        <p:spPr>
+          <a:xfrm>
+            <a:off x="4877460" y="2367582"/>
+            <a:ext cx="1065029" cy="137160"/>
+          </a:xfrm>
+          <a:prstGeom prst="rect">
+            <a:avLst/>
+          </a:prstGeom>
+          <a:solidFill>
+            <a:srgbClr val="746AAE">
+              <a:alpha val="40000"/>
+            </a:srgbClr>
+          </a:solidFill>
+          <a:ln>
+            <a:noFill/>
+          </a:ln>
+        </p:spPr>
+        <p:style>
+          <a:lnRef idx="2">
+            <a:schemeClr val="accent1">
+              <a:shade val="50000"/>
+            </a:schemeClr>
+          </a:lnRef>
+          <a:fillRef idx="1">
+            <a:schemeClr val="accent1"/>
+          </a:fillRef>
+          <a:effectRef idx="0">
+            <a:schemeClr val="accent1"/>
+          </a:effectRef>
+          <a:fontRef idx="minor">
+            <a:schemeClr val="lt1"/>
+          </a:fontRef>
+        </p:style>
+        <p:txBody>
+          <a:bodyPr rtlCol="0" anchor="ctr"/>
+          <a:lstStyle/>
+          <a:p>
+            <a:pPr algn="ctr"/>
+            <a:endParaRPr lang="en-US"/>
+          </a:p>
+        </p:txBody>
+      </p:sp>
+      <p:sp>
+        <p:nvSpPr>
+          <p:cNvPr id="21" name="Rectangle 20">
+            <a:extLst>
+              <a:ext uri="{FF2B5EF4-FFF2-40B4-BE49-F238E27FC236}">
+                <a16:creationId xmlns:a16="http://schemas.microsoft.com/office/drawing/2014/main" id="{795AA10E-C231-884D-847B-18DEA59B2842}"/>
+              </a:ext>
+            </a:extLst>
+          </p:cNvPr>
+          <p:cNvSpPr/>
+          <p:nvPr/>
+        </p:nvSpPr>
+        <p:spPr>
+          <a:xfrm>
+            <a:off x="3705197" y="372218"/>
+            <a:ext cx="1065029" cy="137160"/>
+          </a:xfrm>
+          <a:prstGeom prst="rect">
+            <a:avLst/>
+          </a:prstGeom>
+          <a:solidFill>
+            <a:srgbClr val="E7540C">
+              <a:alpha val="40000"/>
+            </a:srgbClr>
+          </a:solidFill>
+          <a:ln>
+            <a:noFill/>
+          </a:ln>
+        </p:spPr>
+        <p:style>
+          <a:lnRef idx="2">
+            <a:schemeClr val="accent1">
+              <a:shade val="50000"/>
+            </a:schemeClr>
+          </a:lnRef>
+          <a:fillRef idx="1">
+            <a:schemeClr val="accent1"/>
+          </a:fillRef>
+          <a:effectRef idx="0">
+            <a:schemeClr val="accent1"/>
+          </a:effectRef>
+          <a:fontRef idx="minor">
+            <a:schemeClr val="lt1"/>
+          </a:fontRef>
+        </p:style>
+        <p:txBody>
+          <a:bodyPr rtlCol="0" anchor="ctr"/>
+          <a:lstStyle/>
+          <a:p>
+            <a:pPr algn="ctr"/>
+            <a:endParaRPr lang="en-US"/>
+          </a:p>
+        </p:txBody>
+      </p:sp>
+      <p:sp>
+        <p:nvSpPr>
+          <p:cNvPr id="22" name="Rectangle 21">
+            <a:extLst>
+              <a:ext uri="{FF2B5EF4-FFF2-40B4-BE49-F238E27FC236}">
+                <a16:creationId xmlns:a16="http://schemas.microsoft.com/office/drawing/2014/main" id="{4112CB69-60CC-B24A-B5CB-6EA88A230B0E}"/>
+              </a:ext>
+            </a:extLst>
+          </p:cNvPr>
+          <p:cNvSpPr/>
+          <p:nvPr/>
+        </p:nvSpPr>
+        <p:spPr>
+          <a:xfrm>
+            <a:off x="3766209" y="2367582"/>
+            <a:ext cx="1065029" cy="137160"/>
+          </a:xfrm>
+          <a:prstGeom prst="rect">
+            <a:avLst/>
+          </a:prstGeom>
+          <a:solidFill>
+            <a:srgbClr val="E7540C">
+              <a:alpha val="40000"/>
+            </a:srgbClr>
+          </a:solidFill>
+          <a:ln>
+            <a:noFill/>
+          </a:ln>
+        </p:spPr>
+        <p:style>
+          <a:lnRef idx="2">
+            <a:schemeClr val="accent1">
+              <a:shade val="50000"/>
+            </a:schemeClr>
+          </a:lnRef>
+          <a:fillRef idx="1">
+            <a:schemeClr val="accent1"/>
+          </a:fillRef>
+          <a:effectRef idx="0">
+            <a:schemeClr val="accent1"/>
+          </a:effectRef>
+          <a:fontRef idx="minor">
+            <a:schemeClr val="lt1"/>
+          </a:fontRef>
+        </p:style>
+        <p:txBody>
+          <a:bodyPr rtlCol="0" anchor="ctr"/>
+          <a:lstStyle/>
+          <a:p>
+            <a:pPr algn="ctr"/>
+            <a:endParaRPr lang="en-US"/>
+          </a:p>
+        </p:txBody>
+      </p:sp>
+      <p:pic>
+        <p:nvPicPr>
+          <p:cNvPr id="30" name="Picture 29" descr="A close up of a piece of paper&#10;&#10;Description automatically generated">
+            <a:extLst>
+              <a:ext uri="{FF2B5EF4-FFF2-40B4-BE49-F238E27FC236}">
+                <a16:creationId xmlns:a16="http://schemas.microsoft.com/office/drawing/2014/main" id="{BEB87C84-6BEB-C041-A538-12BFA667E2F2}"/>
+              </a:ext>
+            </a:extLst>
+          </p:cNvPr>
+          <p:cNvPicPr>
+            <a:picLocks noChangeAspect="1"/>
+          </p:cNvPicPr>
+          <p:nvPr/>
+        </p:nvPicPr>
+        <p:blipFill>
+          <a:blip r:embed="rId5"/>
+          <a:stretch>
+            <a:fillRect/>
+          </a:stretch>
+        </p:blipFill>
+        <p:spPr>
+          <a:xfrm>
+            <a:off x="1034955" y="327540"/>
+            <a:ext cx="2212870" cy="1475247"/>
+          </a:xfrm>
+          <a:prstGeom prst="rect">
+            <a:avLst/>
+          </a:prstGeom>
+        </p:spPr>
+      </p:pic>
+    </p:spTree>
+    <p:extLst>
+      <p:ext uri="{BB962C8B-B14F-4D97-AF65-F5344CB8AC3E}">
+        <p14:creationId xmlns:p14="http://schemas.microsoft.com/office/powerpoint/2010/main" val="3085358258"/>
+      </p:ext>
+    </p:extLst>
+  </p:cSld>
+  <p:clrMapOvr>
+    <a:masterClrMapping/>
+  </p:clrMapOvr>
+</p:sld>
+</file>
+
+<file path=ppt/slides/slide3.xml><?xml version="1.0" encoding="utf-8"?>
+<p:sld xmlns:a="http://schemas.openxmlformats.org/drawingml/2006/main" xmlns:r="http://schemas.openxmlformats.org/officeDocument/2006/relationships" xmlns:p="http://schemas.openxmlformats.org/presentationml/2006/main">
+  <p:cSld>
+    <p:spTree>
+      <p:nvGrpSpPr>
+        <p:cNvPr id="1" name=""/>
+        <p:cNvGrpSpPr/>
+        <p:nvPr/>
+      </p:nvGrpSpPr>
+      <p:grpSpPr>
+        <a:xfrm>
+          <a:off x="0" y="0"/>
+          <a:ext cx="0" cy="0"/>
+          <a:chOff x="0" y="0"/>
+          <a:chExt cx="0" cy="0"/>
+        </a:xfrm>
+      </p:grpSpPr>
+      <p:pic>
+        <p:nvPicPr>
           <p:cNvPr id="9" name="Picture 8">
             <a:extLst>
               <a:ext uri="{FF2B5EF4-FFF2-40B4-BE49-F238E27FC236}">

</xml_diff>

<commit_message>
updated PCA and cov figs, added seq sat estim
</commit_message>
<xml_diff>
--- a/analyses/Coverage_analysis/Genome_CpG_coverage_analysis.pptx
+++ b/analyses/Coverage_analysis/Genome_CpG_coverage_analysis.pptx
@@ -8,6 +8,8 @@
     <p:sldId id="256" r:id="rId2"/>
     <p:sldId id="258" r:id="rId3"/>
     <p:sldId id="257" r:id="rId4"/>
+    <p:sldId id="259" r:id="rId5"/>
+    <p:sldId id="260" r:id="rId6"/>
   </p:sldIdLst>
   <p:sldSz cx="12192000" cy="6858000"/>
   <p:notesSz cx="6858000" cy="9144000"/>
@@ -272,7 +274,7 @@
           <a:p>
             <a:fld id="{82D4F6AE-CA59-3443-824E-4701B35C102B}" type="datetimeFigureOut">
               <a:rPr lang="en-US" smtClean="0"/>
-              <a:t>7/9/20</a:t>
+              <a:t>7/27/20</a:t>
             </a:fld>
             <a:endParaRPr lang="en-US"/>
           </a:p>
@@ -470,7 +472,7 @@
           <a:p>
             <a:fld id="{82D4F6AE-CA59-3443-824E-4701B35C102B}" type="datetimeFigureOut">
               <a:rPr lang="en-US" smtClean="0"/>
-              <a:t>7/9/20</a:t>
+              <a:t>7/27/20</a:t>
             </a:fld>
             <a:endParaRPr lang="en-US"/>
           </a:p>
@@ -678,7 +680,7 @@
           <a:p>
             <a:fld id="{82D4F6AE-CA59-3443-824E-4701B35C102B}" type="datetimeFigureOut">
               <a:rPr lang="en-US" smtClean="0"/>
-              <a:t>7/9/20</a:t>
+              <a:t>7/27/20</a:t>
             </a:fld>
             <a:endParaRPr lang="en-US"/>
           </a:p>
@@ -876,7 +878,7 @@
           <a:p>
             <a:fld id="{82D4F6AE-CA59-3443-824E-4701B35C102B}" type="datetimeFigureOut">
               <a:rPr lang="en-US" smtClean="0"/>
-              <a:t>7/9/20</a:t>
+              <a:t>7/27/20</a:t>
             </a:fld>
             <a:endParaRPr lang="en-US"/>
           </a:p>
@@ -1151,7 +1153,7 @@
           <a:p>
             <a:fld id="{82D4F6AE-CA59-3443-824E-4701B35C102B}" type="datetimeFigureOut">
               <a:rPr lang="en-US" smtClean="0"/>
-              <a:t>7/9/20</a:t>
+              <a:t>7/27/20</a:t>
             </a:fld>
             <a:endParaRPr lang="en-US"/>
           </a:p>
@@ -1416,7 +1418,7 @@
           <a:p>
             <a:fld id="{82D4F6AE-CA59-3443-824E-4701B35C102B}" type="datetimeFigureOut">
               <a:rPr lang="en-US" smtClean="0"/>
-              <a:t>7/9/20</a:t>
+              <a:t>7/27/20</a:t>
             </a:fld>
             <a:endParaRPr lang="en-US"/>
           </a:p>
@@ -1828,7 +1830,7 @@
           <a:p>
             <a:fld id="{82D4F6AE-CA59-3443-824E-4701B35C102B}" type="datetimeFigureOut">
               <a:rPr lang="en-US" smtClean="0"/>
-              <a:t>7/9/20</a:t>
+              <a:t>7/27/20</a:t>
             </a:fld>
             <a:endParaRPr lang="en-US"/>
           </a:p>
@@ -1969,7 +1971,7 @@
           <a:p>
             <a:fld id="{82D4F6AE-CA59-3443-824E-4701B35C102B}" type="datetimeFigureOut">
               <a:rPr lang="en-US" smtClean="0"/>
-              <a:t>7/9/20</a:t>
+              <a:t>7/27/20</a:t>
             </a:fld>
             <a:endParaRPr lang="en-US"/>
           </a:p>
@@ -2082,7 +2084,7 @@
           <a:p>
             <a:fld id="{82D4F6AE-CA59-3443-824E-4701B35C102B}" type="datetimeFigureOut">
               <a:rPr lang="en-US" smtClean="0"/>
-              <a:t>7/9/20</a:t>
+              <a:t>7/27/20</a:t>
             </a:fld>
             <a:endParaRPr lang="en-US"/>
           </a:p>
@@ -2393,7 +2395,7 @@
           <a:p>
             <a:fld id="{82D4F6AE-CA59-3443-824E-4701B35C102B}" type="datetimeFigureOut">
               <a:rPr lang="en-US" smtClean="0"/>
-              <a:t>7/9/20</a:t>
+              <a:t>7/27/20</a:t>
             </a:fld>
             <a:endParaRPr lang="en-US"/>
           </a:p>
@@ -2681,7 +2683,7 @@
           <a:p>
             <a:fld id="{82D4F6AE-CA59-3443-824E-4701B35C102B}" type="datetimeFigureOut">
               <a:rPr lang="en-US" smtClean="0"/>
-              <a:t>7/9/20</a:t>
+              <a:t>7/27/20</a:t>
             </a:fld>
             <a:endParaRPr lang="en-US"/>
           </a:p>
@@ -2922,7 +2924,7 @@
           <a:p>
             <a:fld id="{82D4F6AE-CA59-3443-824E-4701B35C102B}" type="datetimeFigureOut">
               <a:rPr lang="en-US" smtClean="0"/>
-              <a:t>7/9/20</a:t>
+              <a:t>7/27/20</a:t>
             </a:fld>
             <a:endParaRPr lang="en-US"/>
           </a:p>
@@ -3341,10 +3343,10 @@
       </p:grpSpPr>
       <p:pic>
         <p:nvPicPr>
-          <p:cNvPr id="25" name="Picture 24" descr="A picture containing clock&#10;&#10;Description automatically generated">
-            <a:extLst>
-              <a:ext uri="{FF2B5EF4-FFF2-40B4-BE49-F238E27FC236}">
-                <a16:creationId xmlns:a16="http://schemas.microsoft.com/office/drawing/2014/main" id="{8EA4569F-DA78-6B43-937C-FF4B3DE731EC}"/>
+          <p:cNvPr id="6" name="Picture 5" descr="A picture containing clock&#10;&#10;Description automatically generated">
+            <a:extLst>
+              <a:ext uri="{FF2B5EF4-FFF2-40B4-BE49-F238E27FC236}">
+                <a16:creationId xmlns:a16="http://schemas.microsoft.com/office/drawing/2014/main" id="{0021851C-C2FD-214D-9289-E22338B48734}"/>
               </a:ext>
             </a:extLst>
           </p:cNvPr>
@@ -3361,8 +3363,8 @@
         </p:blipFill>
         <p:spPr>
           <a:xfrm>
-            <a:off x="3378273" y="2322840"/>
-            <a:ext cx="4696207" cy="1565402"/>
+            <a:off x="3380509" y="324640"/>
+            <a:ext cx="4607996" cy="1535998"/>
           </a:xfrm>
           <a:prstGeom prst="rect">
             <a:avLst/>
@@ -3371,10 +3373,10 @@
       </p:pic>
       <p:pic>
         <p:nvPicPr>
-          <p:cNvPr id="23" name="Picture 22" descr="A close up of a logo&#10;&#10;Description automatically generated">
-            <a:extLst>
-              <a:ext uri="{FF2B5EF4-FFF2-40B4-BE49-F238E27FC236}">
-                <a16:creationId xmlns:a16="http://schemas.microsoft.com/office/drawing/2014/main" id="{0EEA30BC-7626-794A-9A25-5D8E9CF192BC}"/>
+          <p:cNvPr id="25" name="Picture 24" descr="A picture containing clock&#10;&#10;Description automatically generated">
+            <a:extLst>
+              <a:ext uri="{FF2B5EF4-FFF2-40B4-BE49-F238E27FC236}">
+                <a16:creationId xmlns:a16="http://schemas.microsoft.com/office/drawing/2014/main" id="{8EA4569F-DA78-6B43-937C-FF4B3DE731EC}"/>
               </a:ext>
             </a:extLst>
           </p:cNvPr>
@@ -3391,8 +3393,8 @@
         </p:blipFill>
         <p:spPr>
           <a:xfrm>
-            <a:off x="1119950" y="2470849"/>
-            <a:ext cx="2227344" cy="1484896"/>
+            <a:off x="3378273" y="2322840"/>
+            <a:ext cx="4696207" cy="1565402"/>
           </a:xfrm>
           <a:prstGeom prst="rect">
             <a:avLst/>
@@ -3401,10 +3403,10 @@
       </p:pic>
       <p:pic>
         <p:nvPicPr>
-          <p:cNvPr id="17" name="Picture 16" descr="A screenshot of a cell phone&#10;&#10;Description automatically generated">
-            <a:extLst>
-              <a:ext uri="{FF2B5EF4-FFF2-40B4-BE49-F238E27FC236}">
-                <a16:creationId xmlns:a16="http://schemas.microsoft.com/office/drawing/2014/main" id="{E7D9B9E3-A45B-A841-86C9-314395B98C20}"/>
+          <p:cNvPr id="23" name="Picture 22" descr="A close up of a logo&#10;&#10;Description automatically generated">
+            <a:extLst>
+              <a:ext uri="{FF2B5EF4-FFF2-40B4-BE49-F238E27FC236}">
+                <a16:creationId xmlns:a16="http://schemas.microsoft.com/office/drawing/2014/main" id="{0EEA30BC-7626-794A-9A25-5D8E9CF192BC}"/>
               </a:ext>
             </a:extLst>
           </p:cNvPr>
@@ -3421,8 +3423,8 @@
         </p:blipFill>
         <p:spPr>
           <a:xfrm>
-            <a:off x="1119950" y="422182"/>
-            <a:ext cx="2140037" cy="1426691"/>
+            <a:off x="1119950" y="2470849"/>
+            <a:ext cx="2227344" cy="1484896"/>
           </a:xfrm>
           <a:prstGeom prst="rect">
             <a:avLst/>
@@ -3431,10 +3433,10 @@
       </p:pic>
       <p:pic>
         <p:nvPicPr>
-          <p:cNvPr id="3" name="Picture 2" descr="A picture containing clock&#10;&#10;Description automatically generated">
-            <a:extLst>
-              <a:ext uri="{FF2B5EF4-FFF2-40B4-BE49-F238E27FC236}">
-                <a16:creationId xmlns:a16="http://schemas.microsoft.com/office/drawing/2014/main" id="{D7D8776B-0FC5-B945-9DC9-2A18AB1C9AD1}"/>
+          <p:cNvPr id="17" name="Picture 16" descr="A screenshot of a cell phone&#10;&#10;Description automatically generated">
+            <a:extLst>
+              <a:ext uri="{FF2B5EF4-FFF2-40B4-BE49-F238E27FC236}">
+                <a16:creationId xmlns:a16="http://schemas.microsoft.com/office/drawing/2014/main" id="{E7D9B9E3-A45B-A841-86C9-314395B98C20}"/>
               </a:ext>
             </a:extLst>
           </p:cNvPr>
@@ -3451,8 +3453,8 @@
         </p:blipFill>
         <p:spPr>
           <a:xfrm>
-            <a:off x="3376262" y="326860"/>
-            <a:ext cx="4620121" cy="1540388"/>
+            <a:off x="1119950" y="422182"/>
+            <a:ext cx="2140037" cy="1426691"/>
           </a:xfrm>
           <a:prstGeom prst="rect">
             <a:avLst/>
@@ -4771,6 +4773,248 @@
 </file>
 
 <file path=ppt/slides/slide3.xml><?xml version="1.0" encoding="utf-8"?>
+<p:sld xmlns:a="http://schemas.openxmlformats.org/drawingml/2006/main" xmlns:r="http://schemas.openxmlformats.org/officeDocument/2006/relationships" xmlns:p="http://schemas.openxmlformats.org/presentationml/2006/main" show="0">
+  <p:cSld>
+    <p:spTree>
+      <p:nvGrpSpPr>
+        <p:cNvPr id="1" name=""/>
+        <p:cNvGrpSpPr/>
+        <p:nvPr/>
+      </p:nvGrpSpPr>
+      <p:grpSpPr>
+        <a:xfrm>
+          <a:off x="0" y="0"/>
+          <a:ext cx="0" cy="0"/>
+          <a:chOff x="0" y="0"/>
+          <a:chExt cx="0" cy="0"/>
+        </a:xfrm>
+      </p:grpSpPr>
+      <p:pic>
+        <p:nvPicPr>
+          <p:cNvPr id="7" name="Picture 6" descr="A close up of a map&#10;&#10;Description automatically generated">
+            <a:extLst>
+              <a:ext uri="{FF2B5EF4-FFF2-40B4-BE49-F238E27FC236}">
+                <a16:creationId xmlns:a16="http://schemas.microsoft.com/office/drawing/2014/main" id="{288FC3D5-F239-8E4E-AEAA-2CF7E9473011}"/>
+              </a:ext>
+            </a:extLst>
+          </p:cNvPr>
+          <p:cNvPicPr>
+            <a:picLocks noChangeAspect="1"/>
+          </p:cNvPicPr>
+          <p:nvPr/>
+        </p:nvPicPr>
+        <p:blipFill>
+          <a:blip r:embed="rId2"/>
+          <a:stretch>
+            <a:fillRect/>
+          </a:stretch>
+        </p:blipFill>
+        <p:spPr>
+          <a:xfrm>
+            <a:off x="18536" y="268965"/>
+            <a:ext cx="7969827" cy="3187931"/>
+          </a:xfrm>
+          <a:prstGeom prst="rect">
+            <a:avLst/>
+          </a:prstGeom>
+        </p:spPr>
+      </p:pic>
+      <p:pic>
+        <p:nvPicPr>
+          <p:cNvPr id="10" name="Picture 9" descr="A close up of a map&#10;&#10;Description automatically generated">
+            <a:extLst>
+              <a:ext uri="{FF2B5EF4-FFF2-40B4-BE49-F238E27FC236}">
+                <a16:creationId xmlns:a16="http://schemas.microsoft.com/office/drawing/2014/main" id="{FE0277BE-4F48-2D47-B16E-291F728ADF5A}"/>
+              </a:ext>
+            </a:extLst>
+          </p:cNvPr>
+          <p:cNvPicPr>
+            <a:picLocks noChangeAspect="1"/>
+          </p:cNvPicPr>
+          <p:nvPr/>
+        </p:nvPicPr>
+        <p:blipFill>
+          <a:blip r:embed="rId3"/>
+          <a:stretch>
+            <a:fillRect/>
+          </a:stretch>
+        </p:blipFill>
+        <p:spPr>
+          <a:xfrm>
+            <a:off x="18536" y="3662589"/>
+            <a:ext cx="7969827" cy="3187931"/>
+          </a:xfrm>
+          <a:prstGeom prst="rect">
+            <a:avLst/>
+          </a:prstGeom>
+        </p:spPr>
+      </p:pic>
+      <p:sp>
+        <p:nvSpPr>
+          <p:cNvPr id="16" name="TextBox 15">
+            <a:extLst>
+              <a:ext uri="{FF2B5EF4-FFF2-40B4-BE49-F238E27FC236}">
+                <a16:creationId xmlns:a16="http://schemas.microsoft.com/office/drawing/2014/main" id="{D3C51DB7-CCCA-7F40-9872-3EAE3D6D7D6C}"/>
+              </a:ext>
+            </a:extLst>
+          </p:cNvPr>
+          <p:cNvSpPr txBox="1"/>
+          <p:nvPr/>
+        </p:nvSpPr>
+        <p:spPr>
+          <a:xfrm>
+            <a:off x="-23685" y="-215"/>
+            <a:ext cx="332142" cy="338554"/>
+          </a:xfrm>
+          <a:prstGeom prst="rect">
+            <a:avLst/>
+          </a:prstGeom>
+          <a:noFill/>
+        </p:spPr>
+        <p:txBody>
+          <a:bodyPr wrap="none" rtlCol="0">
+            <a:spAutoFit/>
+          </a:bodyPr>
+          <a:lstStyle/>
+          <a:p>
+            <a:r>
+              <a:rPr lang="en-US" sz="1600" b="1" dirty="0">
+                <a:latin typeface="Arial" panose="020B0604020202020204" pitchFamily="34" charset="0"/>
+                <a:cs typeface="Arial" panose="020B0604020202020204" pitchFamily="34" charset="0"/>
+              </a:rPr>
+              <a:t>A</a:t>
+            </a:r>
+          </a:p>
+        </p:txBody>
+      </p:sp>
+      <p:sp>
+        <p:nvSpPr>
+          <p:cNvPr id="17" name="TextBox 16">
+            <a:extLst>
+              <a:ext uri="{FF2B5EF4-FFF2-40B4-BE49-F238E27FC236}">
+                <a16:creationId xmlns:a16="http://schemas.microsoft.com/office/drawing/2014/main" id="{4A36F184-BD8F-524A-947E-7E13265EB044}"/>
+              </a:ext>
+            </a:extLst>
+          </p:cNvPr>
+          <p:cNvSpPr txBox="1"/>
+          <p:nvPr/>
+        </p:nvSpPr>
+        <p:spPr>
+          <a:xfrm>
+            <a:off x="4061663" y="-215"/>
+            <a:ext cx="332142" cy="338554"/>
+          </a:xfrm>
+          <a:prstGeom prst="rect">
+            <a:avLst/>
+          </a:prstGeom>
+          <a:noFill/>
+        </p:spPr>
+        <p:txBody>
+          <a:bodyPr wrap="none" rtlCol="0">
+            <a:spAutoFit/>
+          </a:bodyPr>
+          <a:lstStyle/>
+          <a:p>
+            <a:r>
+              <a:rPr lang="en-US" sz="1600" b="1" dirty="0">
+                <a:latin typeface="Arial" panose="020B0604020202020204" pitchFamily="34" charset="0"/>
+                <a:cs typeface="Arial" panose="020B0604020202020204" pitchFamily="34" charset="0"/>
+              </a:rPr>
+              <a:t>B</a:t>
+            </a:r>
+          </a:p>
+        </p:txBody>
+      </p:sp>
+      <p:sp>
+        <p:nvSpPr>
+          <p:cNvPr id="18" name="TextBox 17">
+            <a:extLst>
+              <a:ext uri="{FF2B5EF4-FFF2-40B4-BE49-F238E27FC236}">
+                <a16:creationId xmlns:a16="http://schemas.microsoft.com/office/drawing/2014/main" id="{E478A6CA-5575-4243-804A-050D98094743}"/>
+              </a:ext>
+            </a:extLst>
+          </p:cNvPr>
+          <p:cNvSpPr txBox="1"/>
+          <p:nvPr/>
+        </p:nvSpPr>
+        <p:spPr>
+          <a:xfrm>
+            <a:off x="-23685" y="3429000"/>
+            <a:ext cx="332142" cy="338554"/>
+          </a:xfrm>
+          <a:prstGeom prst="rect">
+            <a:avLst/>
+          </a:prstGeom>
+          <a:noFill/>
+        </p:spPr>
+        <p:txBody>
+          <a:bodyPr wrap="none" rtlCol="0">
+            <a:spAutoFit/>
+          </a:bodyPr>
+          <a:lstStyle/>
+          <a:p>
+            <a:r>
+              <a:rPr lang="en-US" sz="1600" b="1" dirty="0">
+                <a:latin typeface="Arial" panose="020B0604020202020204" pitchFamily="34" charset="0"/>
+                <a:cs typeface="Arial" panose="020B0604020202020204" pitchFamily="34" charset="0"/>
+              </a:rPr>
+              <a:t>C</a:t>
+            </a:r>
+          </a:p>
+        </p:txBody>
+      </p:sp>
+      <p:sp>
+        <p:nvSpPr>
+          <p:cNvPr id="19" name="TextBox 18">
+            <a:extLst>
+              <a:ext uri="{FF2B5EF4-FFF2-40B4-BE49-F238E27FC236}">
+                <a16:creationId xmlns:a16="http://schemas.microsoft.com/office/drawing/2014/main" id="{F0C57B86-BADF-004A-BA71-82B781715A79}"/>
+              </a:ext>
+            </a:extLst>
+          </p:cNvPr>
+          <p:cNvSpPr txBox="1"/>
+          <p:nvPr/>
+        </p:nvSpPr>
+        <p:spPr>
+          <a:xfrm>
+            <a:off x="4061663" y="3429000"/>
+            <a:ext cx="332142" cy="338554"/>
+          </a:xfrm>
+          <a:prstGeom prst="rect">
+            <a:avLst/>
+          </a:prstGeom>
+          <a:noFill/>
+        </p:spPr>
+        <p:txBody>
+          <a:bodyPr wrap="none" rtlCol="0">
+            <a:spAutoFit/>
+          </a:bodyPr>
+          <a:lstStyle/>
+          <a:p>
+            <a:r>
+              <a:rPr lang="en-US" sz="1600" b="1" dirty="0">
+                <a:latin typeface="Arial" panose="020B0604020202020204" pitchFamily="34" charset="0"/>
+                <a:cs typeface="Arial" panose="020B0604020202020204" pitchFamily="34" charset="0"/>
+              </a:rPr>
+              <a:t>D</a:t>
+            </a:r>
+          </a:p>
+        </p:txBody>
+      </p:sp>
+    </p:spTree>
+    <p:extLst>
+      <p:ext uri="{BB962C8B-B14F-4D97-AF65-F5344CB8AC3E}">
+        <p14:creationId xmlns:p14="http://schemas.microsoft.com/office/powerpoint/2010/main" val="2514897300"/>
+      </p:ext>
+    </p:extLst>
+  </p:cSld>
+  <p:clrMapOvr>
+    <a:masterClrMapping/>
+  </p:clrMapOvr>
+</p:sld>
+</file>
+
+<file path=ppt/slides/slide4.xml><?xml version="1.0" encoding="utf-8"?>
 <p:sld xmlns:a="http://schemas.openxmlformats.org/drawingml/2006/main" xmlns:r="http://schemas.openxmlformats.org/officeDocument/2006/relationships" xmlns:p="http://schemas.openxmlformats.org/presentationml/2006/main">
   <p:cSld>
     <p:spTree>
@@ -4792,7 +5036,7 @@
           <p:cNvPr id="7" name="Picture 6" descr="A close up of a map&#10;&#10;Description automatically generated">
             <a:extLst>
               <a:ext uri="{FF2B5EF4-FFF2-40B4-BE49-F238E27FC236}">
-                <a16:creationId xmlns:a16="http://schemas.microsoft.com/office/drawing/2014/main" id="{288FC3D5-F239-8E4E-AEAA-2CF7E9473011}"/>
+                <a16:creationId xmlns:a16="http://schemas.microsoft.com/office/drawing/2014/main" id="{D4955BE4-5184-9F44-9295-6F6E71642DEB}"/>
               </a:ext>
             </a:extLst>
           </p:cNvPr>
@@ -4809,20 +5053,126 @@
         </p:blipFill>
         <p:spPr>
           <a:xfrm>
-            <a:off x="18536" y="268965"/>
-            <a:ext cx="7969827" cy="3187931"/>
+            <a:off x="428903" y="65645"/>
+            <a:ext cx="8733029" cy="6792355"/>
           </a:xfrm>
           <a:prstGeom prst="rect">
             <a:avLst/>
           </a:prstGeom>
         </p:spPr>
       </p:pic>
+      <p:sp>
+        <p:nvSpPr>
+          <p:cNvPr id="8" name="TextBox 7">
+            <a:extLst>
+              <a:ext uri="{FF2B5EF4-FFF2-40B4-BE49-F238E27FC236}">
+                <a16:creationId xmlns:a16="http://schemas.microsoft.com/office/drawing/2014/main" id="{D4EEB3FD-385F-964F-BD39-EDD9E73552A8}"/>
+              </a:ext>
+            </a:extLst>
+          </p:cNvPr>
+          <p:cNvSpPr txBox="1"/>
+          <p:nvPr/>
+        </p:nvSpPr>
+        <p:spPr>
+          <a:xfrm rot="16200000">
+            <a:off x="-663766" y="1452283"/>
+            <a:ext cx="1656223" cy="307777"/>
+          </a:xfrm>
+          <a:prstGeom prst="rect">
+            <a:avLst/>
+          </a:prstGeom>
+          <a:noFill/>
+        </p:spPr>
+        <p:txBody>
+          <a:bodyPr wrap="none" rtlCol="0">
+            <a:spAutoFit/>
+          </a:bodyPr>
+          <a:lstStyle/>
+          <a:p>
+            <a:r>
+              <a:rPr lang="en-US" sz="1400" dirty="0">
+                <a:latin typeface="Arial" panose="020B0604020202020204" pitchFamily="34" charset="0"/>
+                <a:cs typeface="Arial" panose="020B0604020202020204" pitchFamily="34" charset="0"/>
+              </a:rPr>
+              <a:t>alignment features</a:t>
+            </a:r>
+          </a:p>
+        </p:txBody>
+      </p:sp>
+      <p:sp>
+        <p:nvSpPr>
+          <p:cNvPr id="9" name="TextBox 8">
+            <a:extLst>
+              <a:ext uri="{FF2B5EF4-FFF2-40B4-BE49-F238E27FC236}">
+                <a16:creationId xmlns:a16="http://schemas.microsoft.com/office/drawing/2014/main" id="{F66FFDDE-F1F3-B247-8FD7-197FE6804C11}"/>
+              </a:ext>
+            </a:extLst>
+          </p:cNvPr>
+          <p:cNvSpPr txBox="1"/>
+          <p:nvPr/>
+        </p:nvSpPr>
+        <p:spPr>
+          <a:xfrm rot="16200000">
+            <a:off x="-598814" y="4627005"/>
+            <a:ext cx="1636987" cy="307777"/>
+          </a:xfrm>
+          <a:prstGeom prst="rect">
+            <a:avLst/>
+          </a:prstGeom>
+          <a:noFill/>
+        </p:spPr>
+        <p:txBody>
+          <a:bodyPr wrap="none" rtlCol="0">
+            <a:spAutoFit/>
+          </a:bodyPr>
+          <a:lstStyle/>
+          <a:p>
+            <a:r>
+              <a:rPr lang="en-US" sz="1400" dirty="0">
+                <a:latin typeface="Arial" panose="020B0604020202020204" pitchFamily="34" charset="0"/>
+                <a:cs typeface="Arial" panose="020B0604020202020204" pitchFamily="34" charset="0"/>
+              </a:rPr>
+              <a:t>methylation profile</a:t>
+            </a:r>
+          </a:p>
+        </p:txBody>
+      </p:sp>
+    </p:spTree>
+    <p:extLst>
+      <p:ext uri="{BB962C8B-B14F-4D97-AF65-F5344CB8AC3E}">
+        <p14:creationId xmlns:p14="http://schemas.microsoft.com/office/powerpoint/2010/main" val="3656917822"/>
+      </p:ext>
+    </p:extLst>
+  </p:cSld>
+  <p:clrMapOvr>
+    <a:masterClrMapping/>
+  </p:clrMapOvr>
+</p:sld>
+</file>
+
+<file path=ppt/slides/slide5.xml><?xml version="1.0" encoding="utf-8"?>
+<p:sld xmlns:a="http://schemas.openxmlformats.org/drawingml/2006/main" xmlns:r="http://schemas.openxmlformats.org/officeDocument/2006/relationships" xmlns:p="http://schemas.openxmlformats.org/presentationml/2006/main">
+  <p:cSld>
+    <p:spTree>
+      <p:nvGrpSpPr>
+        <p:cNvPr id="1" name=""/>
+        <p:cNvGrpSpPr/>
+        <p:nvPr/>
+      </p:nvGrpSpPr>
+      <p:grpSpPr>
+        <a:xfrm>
+          <a:off x="0" y="0"/>
+          <a:ext cx="0" cy="0"/>
+          <a:chOff x="0" y="0"/>
+          <a:chExt cx="0" cy="0"/>
+        </a:xfrm>
+      </p:grpSpPr>
       <p:pic>
         <p:nvPicPr>
-          <p:cNvPr id="10" name="Picture 9" descr="A close up of a map&#10;&#10;Description automatically generated">
-            <a:extLst>
-              <a:ext uri="{FF2B5EF4-FFF2-40B4-BE49-F238E27FC236}">
-                <a16:creationId xmlns:a16="http://schemas.microsoft.com/office/drawing/2014/main" id="{FE0277BE-4F48-2D47-B16E-291F728ADF5A}"/>
+          <p:cNvPr id="5" name="Picture 4" descr="A picture containing text, map&#10;&#10;Description automatically generated">
+            <a:extLst>
+              <a:ext uri="{FF2B5EF4-FFF2-40B4-BE49-F238E27FC236}">
+                <a16:creationId xmlns:a16="http://schemas.microsoft.com/office/drawing/2014/main" id="{57AD7124-26F0-FA42-9CDB-F961B486A27D}"/>
               </a:ext>
             </a:extLst>
           </p:cNvPr>
@@ -4831,28 +5181,380 @@
           </p:cNvPicPr>
           <p:nvPr/>
         </p:nvPicPr>
-        <p:blipFill>
-          <a:blip r:embed="rId3"/>
-          <a:stretch>
-            <a:fillRect/>
-          </a:stretch>
+        <p:blipFill rotWithShape="1">
+          <a:blip r:embed="rId2"/>
+          <a:srcRect l="3521"/>
+          <a:stretch/>
         </p:blipFill>
         <p:spPr>
           <a:xfrm>
-            <a:off x="18536" y="3662589"/>
-            <a:ext cx="7969827" cy="3187931"/>
+            <a:off x="4793225" y="0"/>
+            <a:ext cx="4410997" cy="6858000"/>
           </a:xfrm>
           <a:prstGeom prst="rect">
             <a:avLst/>
           </a:prstGeom>
         </p:spPr>
       </p:pic>
-      <p:sp>
-        <p:nvSpPr>
-          <p:cNvPr id="16" name="TextBox 15">
-            <a:extLst>
-              <a:ext uri="{FF2B5EF4-FFF2-40B4-BE49-F238E27FC236}">
-                <a16:creationId xmlns:a16="http://schemas.microsoft.com/office/drawing/2014/main" id="{D3C51DB7-CCCA-7F40-9872-3EAE3D6D7D6C}"/>
+      <p:pic>
+        <p:nvPicPr>
+          <p:cNvPr id="7" name="Picture 6" descr="A close up of a map&#10;&#10;Description automatically generated">
+            <a:extLst>
+              <a:ext uri="{FF2B5EF4-FFF2-40B4-BE49-F238E27FC236}">
+                <a16:creationId xmlns:a16="http://schemas.microsoft.com/office/drawing/2014/main" id="{D9AC6127-EA27-A547-99FC-93E8B211FAD8}"/>
+              </a:ext>
+            </a:extLst>
+          </p:cNvPr>
+          <p:cNvPicPr>
+            <a:picLocks noChangeAspect="1"/>
+          </p:cNvPicPr>
+          <p:nvPr/>
+        </p:nvPicPr>
+        <p:blipFill rotWithShape="1">
+          <a:blip r:embed="rId3"/>
+          <a:srcRect r="18495"/>
+          <a:stretch/>
+        </p:blipFill>
+        <p:spPr>
+          <a:xfrm>
+            <a:off x="875072" y="0"/>
+            <a:ext cx="3726425" cy="6858000"/>
+          </a:xfrm>
+          <a:prstGeom prst="rect">
+            <a:avLst/>
+          </a:prstGeom>
+        </p:spPr>
+      </p:pic>
+      <p:sp>
+        <p:nvSpPr>
+          <p:cNvPr id="8" name="Rectangle 7">
+            <a:extLst>
+              <a:ext uri="{FF2B5EF4-FFF2-40B4-BE49-F238E27FC236}">
+                <a16:creationId xmlns:a16="http://schemas.microsoft.com/office/drawing/2014/main" id="{5712AE15-D45C-A54D-8C79-2B89C69C13ED}"/>
+              </a:ext>
+            </a:extLst>
+          </p:cNvPr>
+          <p:cNvSpPr/>
+          <p:nvPr/>
+        </p:nvSpPr>
+        <p:spPr>
+          <a:xfrm>
+            <a:off x="1307935" y="4569444"/>
+            <a:ext cx="3217002" cy="168891"/>
+          </a:xfrm>
+          <a:prstGeom prst="rect">
+            <a:avLst/>
+          </a:prstGeom>
+          <a:solidFill>
+            <a:srgbClr val="34A352">
+              <a:alpha val="40000"/>
+            </a:srgbClr>
+          </a:solidFill>
+          <a:ln>
+            <a:noFill/>
+          </a:ln>
+        </p:spPr>
+        <p:style>
+          <a:lnRef idx="2">
+            <a:schemeClr val="accent1">
+              <a:shade val="50000"/>
+            </a:schemeClr>
+          </a:lnRef>
+          <a:fillRef idx="1">
+            <a:schemeClr val="accent1"/>
+          </a:fillRef>
+          <a:effectRef idx="0">
+            <a:schemeClr val="accent1"/>
+          </a:effectRef>
+          <a:fontRef idx="minor">
+            <a:schemeClr val="lt1"/>
+          </a:fontRef>
+        </p:style>
+        <p:txBody>
+          <a:bodyPr rtlCol="0" anchor="ctr"/>
+          <a:lstStyle/>
+          <a:p>
+            <a:pPr algn="ctr"/>
+            <a:endParaRPr lang="en-US"/>
+          </a:p>
+        </p:txBody>
+      </p:sp>
+      <p:sp>
+        <p:nvSpPr>
+          <p:cNvPr id="9" name="Rectangle 8">
+            <a:extLst>
+              <a:ext uri="{FF2B5EF4-FFF2-40B4-BE49-F238E27FC236}">
+                <a16:creationId xmlns:a16="http://schemas.microsoft.com/office/drawing/2014/main" id="{02CB7F5E-6BA9-2E4D-8CBD-8767A76FA5F8}"/>
+              </a:ext>
+            </a:extLst>
+          </p:cNvPr>
+          <p:cNvSpPr/>
+          <p:nvPr/>
+        </p:nvSpPr>
+        <p:spPr>
+          <a:xfrm>
+            <a:off x="1307935" y="2408705"/>
+            <a:ext cx="3217002" cy="168891"/>
+          </a:xfrm>
+          <a:prstGeom prst="rect">
+            <a:avLst/>
+          </a:prstGeom>
+          <a:solidFill>
+            <a:srgbClr val="746AAE">
+              <a:alpha val="40000"/>
+            </a:srgbClr>
+          </a:solidFill>
+          <a:ln>
+            <a:noFill/>
+          </a:ln>
+        </p:spPr>
+        <p:style>
+          <a:lnRef idx="2">
+            <a:schemeClr val="accent1">
+              <a:shade val="50000"/>
+            </a:schemeClr>
+          </a:lnRef>
+          <a:fillRef idx="1">
+            <a:schemeClr val="accent1"/>
+          </a:fillRef>
+          <a:effectRef idx="0">
+            <a:schemeClr val="accent1"/>
+          </a:effectRef>
+          <a:fontRef idx="minor">
+            <a:schemeClr val="lt1"/>
+          </a:fontRef>
+        </p:style>
+        <p:txBody>
+          <a:bodyPr rtlCol="0" anchor="ctr"/>
+          <a:lstStyle/>
+          <a:p>
+            <a:pPr algn="ctr"/>
+            <a:endParaRPr lang="en-US"/>
+          </a:p>
+        </p:txBody>
+      </p:sp>
+      <p:sp>
+        <p:nvSpPr>
+          <p:cNvPr id="10" name="Rectangle 9">
+            <a:extLst>
+              <a:ext uri="{FF2B5EF4-FFF2-40B4-BE49-F238E27FC236}">
+                <a16:creationId xmlns:a16="http://schemas.microsoft.com/office/drawing/2014/main" id="{3E6503BE-DDDB-3548-92A4-9371EB4544DC}"/>
+              </a:ext>
+            </a:extLst>
+          </p:cNvPr>
+          <p:cNvSpPr/>
+          <p:nvPr/>
+        </p:nvSpPr>
+        <p:spPr>
+          <a:xfrm>
+            <a:off x="1307935" y="247966"/>
+            <a:ext cx="3217002" cy="168891"/>
+          </a:xfrm>
+          <a:prstGeom prst="rect">
+            <a:avLst/>
+          </a:prstGeom>
+          <a:solidFill>
+            <a:srgbClr val="E7540C">
+              <a:alpha val="40000"/>
+            </a:srgbClr>
+          </a:solidFill>
+          <a:ln>
+            <a:noFill/>
+          </a:ln>
+        </p:spPr>
+        <p:style>
+          <a:lnRef idx="2">
+            <a:schemeClr val="accent1">
+              <a:shade val="50000"/>
+            </a:schemeClr>
+          </a:lnRef>
+          <a:fillRef idx="1">
+            <a:schemeClr val="accent1"/>
+          </a:fillRef>
+          <a:effectRef idx="0">
+            <a:schemeClr val="accent1"/>
+          </a:effectRef>
+          <a:fontRef idx="minor">
+            <a:schemeClr val="lt1"/>
+          </a:fontRef>
+        </p:style>
+        <p:txBody>
+          <a:bodyPr rtlCol="0" anchor="ctr"/>
+          <a:lstStyle/>
+          <a:p>
+            <a:pPr algn="ctr"/>
+            <a:endParaRPr lang="en-US"/>
+          </a:p>
+        </p:txBody>
+      </p:sp>
+      <p:sp>
+        <p:nvSpPr>
+          <p:cNvPr id="11" name="Rectangle 10">
+            <a:extLst>
+              <a:ext uri="{FF2B5EF4-FFF2-40B4-BE49-F238E27FC236}">
+                <a16:creationId xmlns:a16="http://schemas.microsoft.com/office/drawing/2014/main" id="{EF99B303-1A8B-1A40-8773-4386ED7875FE}"/>
+              </a:ext>
+            </a:extLst>
+          </p:cNvPr>
+          <p:cNvSpPr/>
+          <p:nvPr/>
+        </p:nvSpPr>
+        <p:spPr>
+          <a:xfrm>
+            <a:off x="5063526" y="4569444"/>
+            <a:ext cx="3217002" cy="168891"/>
+          </a:xfrm>
+          <a:prstGeom prst="rect">
+            <a:avLst/>
+          </a:prstGeom>
+          <a:solidFill>
+            <a:srgbClr val="34A352">
+              <a:alpha val="40000"/>
+            </a:srgbClr>
+          </a:solidFill>
+          <a:ln>
+            <a:noFill/>
+          </a:ln>
+        </p:spPr>
+        <p:style>
+          <a:lnRef idx="2">
+            <a:schemeClr val="accent1">
+              <a:shade val="50000"/>
+            </a:schemeClr>
+          </a:lnRef>
+          <a:fillRef idx="1">
+            <a:schemeClr val="accent1"/>
+          </a:fillRef>
+          <a:effectRef idx="0">
+            <a:schemeClr val="accent1"/>
+          </a:effectRef>
+          <a:fontRef idx="minor">
+            <a:schemeClr val="lt1"/>
+          </a:fontRef>
+        </p:style>
+        <p:txBody>
+          <a:bodyPr rtlCol="0" anchor="ctr"/>
+          <a:lstStyle/>
+          <a:p>
+            <a:pPr algn="ctr"/>
+            <a:endParaRPr lang="en-US"/>
+          </a:p>
+        </p:txBody>
+      </p:sp>
+      <p:sp>
+        <p:nvSpPr>
+          <p:cNvPr id="12" name="Rectangle 11">
+            <a:extLst>
+              <a:ext uri="{FF2B5EF4-FFF2-40B4-BE49-F238E27FC236}">
+                <a16:creationId xmlns:a16="http://schemas.microsoft.com/office/drawing/2014/main" id="{FFC2195A-A53D-354A-ACD9-0C9F4359B812}"/>
+              </a:ext>
+            </a:extLst>
+          </p:cNvPr>
+          <p:cNvSpPr/>
+          <p:nvPr/>
+        </p:nvSpPr>
+        <p:spPr>
+          <a:xfrm>
+            <a:off x="5063526" y="2408705"/>
+            <a:ext cx="3217002" cy="168891"/>
+          </a:xfrm>
+          <a:prstGeom prst="rect">
+            <a:avLst/>
+          </a:prstGeom>
+          <a:solidFill>
+            <a:srgbClr val="746AAE">
+              <a:alpha val="40000"/>
+            </a:srgbClr>
+          </a:solidFill>
+          <a:ln>
+            <a:noFill/>
+          </a:ln>
+        </p:spPr>
+        <p:style>
+          <a:lnRef idx="2">
+            <a:schemeClr val="accent1">
+              <a:shade val="50000"/>
+            </a:schemeClr>
+          </a:lnRef>
+          <a:fillRef idx="1">
+            <a:schemeClr val="accent1"/>
+          </a:fillRef>
+          <a:effectRef idx="0">
+            <a:schemeClr val="accent1"/>
+          </a:effectRef>
+          <a:fontRef idx="minor">
+            <a:schemeClr val="lt1"/>
+          </a:fontRef>
+        </p:style>
+        <p:txBody>
+          <a:bodyPr rtlCol="0" anchor="ctr"/>
+          <a:lstStyle/>
+          <a:p>
+            <a:pPr algn="ctr"/>
+            <a:endParaRPr lang="en-US"/>
+          </a:p>
+        </p:txBody>
+      </p:sp>
+      <p:sp>
+        <p:nvSpPr>
+          <p:cNvPr id="13" name="Rectangle 12">
+            <a:extLst>
+              <a:ext uri="{FF2B5EF4-FFF2-40B4-BE49-F238E27FC236}">
+                <a16:creationId xmlns:a16="http://schemas.microsoft.com/office/drawing/2014/main" id="{59CA2760-BC9F-6443-8992-FC82F2C90DEE}"/>
+              </a:ext>
+            </a:extLst>
+          </p:cNvPr>
+          <p:cNvSpPr/>
+          <p:nvPr/>
+        </p:nvSpPr>
+        <p:spPr>
+          <a:xfrm>
+            <a:off x="5063526" y="247966"/>
+            <a:ext cx="3217002" cy="168891"/>
+          </a:xfrm>
+          <a:prstGeom prst="rect">
+            <a:avLst/>
+          </a:prstGeom>
+          <a:solidFill>
+            <a:srgbClr val="E7540C">
+              <a:alpha val="40000"/>
+            </a:srgbClr>
+          </a:solidFill>
+          <a:ln>
+            <a:noFill/>
+          </a:ln>
+        </p:spPr>
+        <p:style>
+          <a:lnRef idx="2">
+            <a:schemeClr val="accent1">
+              <a:shade val="50000"/>
+            </a:schemeClr>
+          </a:lnRef>
+          <a:fillRef idx="1">
+            <a:schemeClr val="accent1"/>
+          </a:fillRef>
+          <a:effectRef idx="0">
+            <a:schemeClr val="accent1"/>
+          </a:effectRef>
+          <a:fontRef idx="minor">
+            <a:schemeClr val="lt1"/>
+          </a:fontRef>
+        </p:style>
+        <p:txBody>
+          <a:bodyPr rtlCol="0" anchor="ctr"/>
+          <a:lstStyle/>
+          <a:p>
+            <a:pPr algn="ctr"/>
+            <a:endParaRPr lang="en-US"/>
+          </a:p>
+        </p:txBody>
+      </p:sp>
+      <p:sp>
+        <p:nvSpPr>
+          <p:cNvPr id="14" name="TextBox 13">
+            <a:extLst>
+              <a:ext uri="{FF2B5EF4-FFF2-40B4-BE49-F238E27FC236}">
+                <a16:creationId xmlns:a16="http://schemas.microsoft.com/office/drawing/2014/main" id="{F89759BF-1346-C845-B14D-65D8F1047B23}"/>
               </a:ext>
             </a:extLst>
           </p:cNvPr>
@@ -4861,7 +5563,7 @@
         </p:nvSpPr>
         <p:spPr>
           <a:xfrm>
-            <a:off x="-23685" y="-215"/>
+            <a:off x="784065" y="-65543"/>
             <a:ext cx="332142" cy="338554"/>
           </a:xfrm>
           <a:prstGeom prst="rect">
@@ -4887,10 +5589,10 @@
       </p:sp>
       <p:sp>
         <p:nvSpPr>
-          <p:cNvPr id="17" name="TextBox 16">
-            <a:extLst>
-              <a:ext uri="{FF2B5EF4-FFF2-40B4-BE49-F238E27FC236}">
-                <a16:creationId xmlns:a16="http://schemas.microsoft.com/office/drawing/2014/main" id="{4A36F184-BD8F-524A-947E-7E13265EB044}"/>
+          <p:cNvPr id="15" name="TextBox 14">
+            <a:extLst>
+              <a:ext uri="{FF2B5EF4-FFF2-40B4-BE49-F238E27FC236}">
+                <a16:creationId xmlns:a16="http://schemas.microsoft.com/office/drawing/2014/main" id="{F8E23C6A-E8B5-F844-8294-9EC9191F8F9B}"/>
               </a:ext>
             </a:extLst>
           </p:cNvPr>
@@ -4899,7 +5601,7 @@
         </p:nvSpPr>
         <p:spPr>
           <a:xfrm>
-            <a:off x="4061663" y="-215"/>
+            <a:off x="4565131" y="-65543"/>
             <a:ext cx="332142" cy="338554"/>
           </a:xfrm>
           <a:prstGeom prst="rect">
@@ -4923,86 +5625,10 @@
           </a:p>
         </p:txBody>
       </p:sp>
-      <p:sp>
-        <p:nvSpPr>
-          <p:cNvPr id="18" name="TextBox 17">
-            <a:extLst>
-              <a:ext uri="{FF2B5EF4-FFF2-40B4-BE49-F238E27FC236}">
-                <a16:creationId xmlns:a16="http://schemas.microsoft.com/office/drawing/2014/main" id="{E478A6CA-5575-4243-804A-050D98094743}"/>
-              </a:ext>
-            </a:extLst>
-          </p:cNvPr>
-          <p:cNvSpPr txBox="1"/>
-          <p:nvPr/>
-        </p:nvSpPr>
-        <p:spPr>
-          <a:xfrm>
-            <a:off x="-23685" y="3429000"/>
-            <a:ext cx="332142" cy="338554"/>
-          </a:xfrm>
-          <a:prstGeom prst="rect">
-            <a:avLst/>
-          </a:prstGeom>
-          <a:noFill/>
-        </p:spPr>
-        <p:txBody>
-          <a:bodyPr wrap="none" rtlCol="0">
-            <a:spAutoFit/>
-          </a:bodyPr>
-          <a:lstStyle/>
-          <a:p>
-            <a:r>
-              <a:rPr lang="en-US" sz="1600" b="1" dirty="0">
-                <a:latin typeface="Arial" panose="020B0604020202020204" pitchFamily="34" charset="0"/>
-                <a:cs typeface="Arial" panose="020B0604020202020204" pitchFamily="34" charset="0"/>
-              </a:rPr>
-              <a:t>C</a:t>
-            </a:r>
-          </a:p>
-        </p:txBody>
-      </p:sp>
-      <p:sp>
-        <p:nvSpPr>
-          <p:cNvPr id="19" name="TextBox 18">
-            <a:extLst>
-              <a:ext uri="{FF2B5EF4-FFF2-40B4-BE49-F238E27FC236}">
-                <a16:creationId xmlns:a16="http://schemas.microsoft.com/office/drawing/2014/main" id="{F0C57B86-BADF-004A-BA71-82B781715A79}"/>
-              </a:ext>
-            </a:extLst>
-          </p:cNvPr>
-          <p:cNvSpPr txBox="1"/>
-          <p:nvPr/>
-        </p:nvSpPr>
-        <p:spPr>
-          <a:xfrm>
-            <a:off x="4061663" y="3429000"/>
-            <a:ext cx="332142" cy="338554"/>
-          </a:xfrm>
-          <a:prstGeom prst="rect">
-            <a:avLst/>
-          </a:prstGeom>
-          <a:noFill/>
-        </p:spPr>
-        <p:txBody>
-          <a:bodyPr wrap="none" rtlCol="0">
-            <a:spAutoFit/>
-          </a:bodyPr>
-          <a:lstStyle/>
-          <a:p>
-            <a:r>
-              <a:rPr lang="en-US" sz="1600" b="1" dirty="0">
-                <a:latin typeface="Arial" panose="020B0604020202020204" pitchFamily="34" charset="0"/>
-                <a:cs typeface="Arial" panose="020B0604020202020204" pitchFamily="34" charset="0"/>
-              </a:rPr>
-              <a:t>D</a:t>
-            </a:r>
-          </a:p>
-        </p:txBody>
-      </p:sp>
     </p:spTree>
     <p:extLst>
       <p:ext uri="{BB962C8B-B14F-4D97-AF65-F5344CB8AC3E}">
-        <p14:creationId xmlns:p14="http://schemas.microsoft.com/office/powerpoint/2010/main" val="2514897300"/>
+        <p14:creationId xmlns:p14="http://schemas.microsoft.com/office/powerpoint/2010/main" val="1182681688"/>
       </p:ext>
     </p:extLst>
   </p:cSld>

</xml_diff>

<commit_message>
added mapping stats fig
</commit_message>
<xml_diff>
--- a/analyses/Coverage_analysis/Genome_CpG_coverage_analysis.pptx
+++ b/analyses/Coverage_analysis/Genome_CpG_coverage_analysis.pptx
@@ -6,10 +6,11 @@
   </p:sldMasterIdLst>
   <p:sldIdLst>
     <p:sldId id="256" r:id="rId2"/>
-    <p:sldId id="258" r:id="rId3"/>
-    <p:sldId id="257" r:id="rId4"/>
-    <p:sldId id="259" r:id="rId5"/>
-    <p:sldId id="260" r:id="rId6"/>
+    <p:sldId id="261" r:id="rId3"/>
+    <p:sldId id="258" r:id="rId4"/>
+    <p:sldId id="257" r:id="rId5"/>
+    <p:sldId id="259" r:id="rId6"/>
+    <p:sldId id="260" r:id="rId7"/>
   </p:sldIdLst>
   <p:sldSz cx="12192000" cy="6858000"/>
   <p:notesSz cx="6858000" cy="9144000"/>
@@ -274,7 +275,7 @@
           <a:p>
             <a:fld id="{82D4F6AE-CA59-3443-824E-4701B35C102B}" type="datetimeFigureOut">
               <a:rPr lang="en-US" smtClean="0"/>
-              <a:t>7/27/20</a:t>
+              <a:t>8/13/20</a:t>
             </a:fld>
             <a:endParaRPr lang="en-US"/>
           </a:p>
@@ -472,7 +473,7 @@
           <a:p>
             <a:fld id="{82D4F6AE-CA59-3443-824E-4701B35C102B}" type="datetimeFigureOut">
               <a:rPr lang="en-US" smtClean="0"/>
-              <a:t>7/27/20</a:t>
+              <a:t>8/13/20</a:t>
             </a:fld>
             <a:endParaRPr lang="en-US"/>
           </a:p>
@@ -680,7 +681,7 @@
           <a:p>
             <a:fld id="{82D4F6AE-CA59-3443-824E-4701B35C102B}" type="datetimeFigureOut">
               <a:rPr lang="en-US" smtClean="0"/>
-              <a:t>7/27/20</a:t>
+              <a:t>8/13/20</a:t>
             </a:fld>
             <a:endParaRPr lang="en-US"/>
           </a:p>
@@ -878,7 +879,7 @@
           <a:p>
             <a:fld id="{82D4F6AE-CA59-3443-824E-4701B35C102B}" type="datetimeFigureOut">
               <a:rPr lang="en-US" smtClean="0"/>
-              <a:t>7/27/20</a:t>
+              <a:t>8/13/20</a:t>
             </a:fld>
             <a:endParaRPr lang="en-US"/>
           </a:p>
@@ -1153,7 +1154,7 @@
           <a:p>
             <a:fld id="{82D4F6AE-CA59-3443-824E-4701B35C102B}" type="datetimeFigureOut">
               <a:rPr lang="en-US" smtClean="0"/>
-              <a:t>7/27/20</a:t>
+              <a:t>8/13/20</a:t>
             </a:fld>
             <a:endParaRPr lang="en-US"/>
           </a:p>
@@ -1418,7 +1419,7 @@
           <a:p>
             <a:fld id="{82D4F6AE-CA59-3443-824E-4701B35C102B}" type="datetimeFigureOut">
               <a:rPr lang="en-US" smtClean="0"/>
-              <a:t>7/27/20</a:t>
+              <a:t>8/13/20</a:t>
             </a:fld>
             <a:endParaRPr lang="en-US"/>
           </a:p>
@@ -1830,7 +1831,7 @@
           <a:p>
             <a:fld id="{82D4F6AE-CA59-3443-824E-4701B35C102B}" type="datetimeFigureOut">
               <a:rPr lang="en-US" smtClean="0"/>
-              <a:t>7/27/20</a:t>
+              <a:t>8/13/20</a:t>
             </a:fld>
             <a:endParaRPr lang="en-US"/>
           </a:p>
@@ -1971,7 +1972,7 @@
           <a:p>
             <a:fld id="{82D4F6AE-CA59-3443-824E-4701B35C102B}" type="datetimeFigureOut">
               <a:rPr lang="en-US" smtClean="0"/>
-              <a:t>7/27/20</a:t>
+              <a:t>8/13/20</a:t>
             </a:fld>
             <a:endParaRPr lang="en-US"/>
           </a:p>
@@ -2084,7 +2085,7 @@
           <a:p>
             <a:fld id="{82D4F6AE-CA59-3443-824E-4701B35C102B}" type="datetimeFigureOut">
               <a:rPr lang="en-US" smtClean="0"/>
-              <a:t>7/27/20</a:t>
+              <a:t>8/13/20</a:t>
             </a:fld>
             <a:endParaRPr lang="en-US"/>
           </a:p>
@@ -2395,7 +2396,7 @@
           <a:p>
             <a:fld id="{82D4F6AE-CA59-3443-824E-4701B35C102B}" type="datetimeFigureOut">
               <a:rPr lang="en-US" smtClean="0"/>
-              <a:t>7/27/20</a:t>
+              <a:t>8/13/20</a:t>
             </a:fld>
             <a:endParaRPr lang="en-US"/>
           </a:p>
@@ -2683,7 +2684,7 @@
           <a:p>
             <a:fld id="{82D4F6AE-CA59-3443-824E-4701B35C102B}" type="datetimeFigureOut">
               <a:rPr lang="en-US" smtClean="0"/>
-              <a:t>7/27/20</a:t>
+              <a:t>8/13/20</a:t>
             </a:fld>
             <a:endParaRPr lang="en-US"/>
           </a:p>
@@ -2924,7 +2925,7 @@
           <a:p>
             <a:fld id="{82D4F6AE-CA59-3443-824E-4701B35C102B}" type="datetimeFigureOut">
               <a:rPr lang="en-US" smtClean="0"/>
-              <a:t>7/27/20</a:t>
+              <a:t>8/13/20</a:t>
             </a:fld>
             <a:endParaRPr lang="en-US"/>
           </a:p>
@@ -4067,10 +4068,10 @@
       </p:grpSpPr>
       <p:pic>
         <p:nvPicPr>
-          <p:cNvPr id="32" name="Picture 31" descr="A picture containing clock&#10;&#10;Description automatically generated">
-            <a:extLst>
-              <a:ext uri="{FF2B5EF4-FFF2-40B4-BE49-F238E27FC236}">
-                <a16:creationId xmlns:a16="http://schemas.microsoft.com/office/drawing/2014/main" id="{E6401F7E-2BF0-2F4E-A468-429B64B23DAB}"/>
+          <p:cNvPr id="5" name="Picture 4" descr="A screenshot of a cell phone&#10;&#10;Description automatically generated">
+            <a:extLst>
+              <a:ext uri="{FF2B5EF4-FFF2-40B4-BE49-F238E27FC236}">
+                <a16:creationId xmlns:a16="http://schemas.microsoft.com/office/drawing/2014/main" id="{307D7D06-27ED-6949-8945-C5FCD4CDEEB5}"/>
               </a:ext>
             </a:extLst>
           </p:cNvPr>
@@ -4087,330 +4088,20 @@
         </p:blipFill>
         <p:spPr>
           <a:xfrm>
-            <a:off x="3376262" y="332199"/>
-            <a:ext cx="4620122" cy="1491093"/>
+            <a:off x="0" y="0"/>
+            <a:ext cx="10972800" cy="6858000"/>
           </a:xfrm>
           <a:prstGeom prst="rect">
             <a:avLst/>
           </a:prstGeom>
         </p:spPr>
       </p:pic>
-      <p:pic>
-        <p:nvPicPr>
-          <p:cNvPr id="29" name="Picture 28" descr="A close up of a piece of paper&#10;&#10;Description automatically generated">
-            <a:extLst>
-              <a:ext uri="{FF2B5EF4-FFF2-40B4-BE49-F238E27FC236}">
-                <a16:creationId xmlns:a16="http://schemas.microsoft.com/office/drawing/2014/main" id="{A7A9243F-7992-0343-9958-B779FB3C6B7A}"/>
-              </a:ext>
-            </a:extLst>
-          </p:cNvPr>
-          <p:cNvPicPr>
-            <a:picLocks noChangeAspect="1"/>
-          </p:cNvPicPr>
-          <p:nvPr/>
-        </p:nvPicPr>
-        <p:blipFill>
-          <a:blip r:embed="rId3"/>
-          <a:stretch>
-            <a:fillRect/>
-          </a:stretch>
-        </p:blipFill>
-        <p:spPr>
-          <a:xfrm>
-            <a:off x="1119057" y="2386632"/>
-            <a:ext cx="2096143" cy="1397428"/>
-          </a:xfrm>
-          <a:prstGeom prst="rect">
-            <a:avLst/>
-          </a:prstGeom>
-        </p:spPr>
-      </p:pic>
-      <p:pic>
-        <p:nvPicPr>
-          <p:cNvPr id="28" name="Picture 27" descr="A screenshot of a cell phone&#10;&#10;Description automatically generated">
-            <a:extLst>
-              <a:ext uri="{FF2B5EF4-FFF2-40B4-BE49-F238E27FC236}">
-                <a16:creationId xmlns:a16="http://schemas.microsoft.com/office/drawing/2014/main" id="{B246D3EF-6A04-3E43-973B-8E461A4D29A0}"/>
-              </a:ext>
-            </a:extLst>
-          </p:cNvPr>
-          <p:cNvPicPr>
-            <a:picLocks noChangeAspect="1"/>
-          </p:cNvPicPr>
-          <p:nvPr/>
-        </p:nvPicPr>
-        <p:blipFill>
-          <a:blip r:embed="rId4"/>
-          <a:stretch>
-            <a:fillRect/>
-          </a:stretch>
-        </p:blipFill>
-        <p:spPr>
-          <a:xfrm>
-            <a:off x="3438400" y="2324034"/>
-            <a:ext cx="4620121" cy="1491093"/>
-          </a:xfrm>
-          <a:prstGeom prst="rect">
-            <a:avLst/>
-          </a:prstGeom>
-        </p:spPr>
-      </p:pic>
-      <p:sp>
-        <p:nvSpPr>
-          <p:cNvPr id="4" name="TextBox 3">
-            <a:extLst>
-              <a:ext uri="{FF2B5EF4-FFF2-40B4-BE49-F238E27FC236}">
-                <a16:creationId xmlns:a16="http://schemas.microsoft.com/office/drawing/2014/main" id="{19A58654-40C5-E84F-BFDD-1764935ABB91}"/>
-              </a:ext>
-            </a:extLst>
-          </p:cNvPr>
-          <p:cNvSpPr txBox="1"/>
-          <p:nvPr/>
-        </p:nvSpPr>
-        <p:spPr>
-          <a:xfrm rot="16200000">
-            <a:off x="242182" y="838373"/>
-            <a:ext cx="936475" cy="276999"/>
-          </a:xfrm>
-          <a:prstGeom prst="rect">
-            <a:avLst/>
-          </a:prstGeom>
-          <a:noFill/>
-        </p:spPr>
-        <p:txBody>
-          <a:bodyPr wrap="none" rtlCol="0">
-            <a:spAutoFit/>
-          </a:bodyPr>
-          <a:lstStyle/>
-          <a:p>
-            <a:r>
-              <a:rPr lang="en-US" sz="1200" i="1" dirty="0">
-                <a:latin typeface="Arial" panose="020B0604020202020204" pitchFamily="34" charset="0"/>
-                <a:cs typeface="Arial" panose="020B0604020202020204" pitchFamily="34" charset="0"/>
-              </a:rPr>
-              <a:t>M. </a:t>
-            </a:r>
-            <a:r>
-              <a:rPr lang="en-US" sz="1200" i="1" dirty="0" err="1">
-                <a:latin typeface="Arial" panose="020B0604020202020204" pitchFamily="34" charset="0"/>
-                <a:cs typeface="Arial" panose="020B0604020202020204" pitchFamily="34" charset="0"/>
-              </a:rPr>
-              <a:t>capitata</a:t>
-            </a:r>
-            <a:endParaRPr lang="en-US" sz="1200" i="1" dirty="0">
-              <a:latin typeface="Arial" panose="020B0604020202020204" pitchFamily="34" charset="0"/>
-              <a:cs typeface="Arial" panose="020B0604020202020204" pitchFamily="34" charset="0"/>
-            </a:endParaRPr>
-          </a:p>
-        </p:txBody>
-      </p:sp>
-      <p:sp>
-        <p:nvSpPr>
-          <p:cNvPr id="5" name="TextBox 4">
-            <a:extLst>
-              <a:ext uri="{FF2B5EF4-FFF2-40B4-BE49-F238E27FC236}">
-                <a16:creationId xmlns:a16="http://schemas.microsoft.com/office/drawing/2014/main" id="{1755ACE4-2B09-ED4F-A4A4-DA421FF8BB39}"/>
-              </a:ext>
-            </a:extLst>
-          </p:cNvPr>
-          <p:cNvSpPr txBox="1"/>
-          <p:nvPr/>
-        </p:nvSpPr>
-        <p:spPr>
-          <a:xfrm rot="16200000">
-            <a:off x="345084" y="2894586"/>
-            <a:ext cx="729110" cy="276999"/>
-          </a:xfrm>
-          <a:prstGeom prst="rect">
-            <a:avLst/>
-          </a:prstGeom>
-          <a:noFill/>
-        </p:spPr>
-        <p:txBody>
-          <a:bodyPr wrap="none" rtlCol="0">
-            <a:spAutoFit/>
-          </a:bodyPr>
-          <a:lstStyle/>
-          <a:p>
-            <a:r>
-              <a:rPr lang="en-US" sz="1200" i="1" dirty="0">
-                <a:latin typeface="Arial" panose="020B0604020202020204" pitchFamily="34" charset="0"/>
-                <a:cs typeface="Arial" panose="020B0604020202020204" pitchFamily="34" charset="0"/>
-              </a:rPr>
-              <a:t>P. </a:t>
-            </a:r>
-            <a:r>
-              <a:rPr lang="en-US" sz="1200" i="1" dirty="0" err="1">
-                <a:latin typeface="Arial" panose="020B0604020202020204" pitchFamily="34" charset="0"/>
-                <a:cs typeface="Arial" panose="020B0604020202020204" pitchFamily="34" charset="0"/>
-              </a:rPr>
-              <a:t>acuta</a:t>
-            </a:r>
-            <a:endParaRPr lang="en-US" sz="1200" i="1" dirty="0">
-              <a:latin typeface="Arial" panose="020B0604020202020204" pitchFamily="34" charset="0"/>
-              <a:cs typeface="Arial" panose="020B0604020202020204" pitchFamily="34" charset="0"/>
-            </a:endParaRPr>
-          </a:p>
-        </p:txBody>
-      </p:sp>
-      <p:sp>
-        <p:nvSpPr>
-          <p:cNvPr id="10" name="TextBox 9">
-            <a:extLst>
-              <a:ext uri="{FF2B5EF4-FFF2-40B4-BE49-F238E27FC236}">
-                <a16:creationId xmlns:a16="http://schemas.microsoft.com/office/drawing/2014/main" id="{D7048156-AA6D-9E44-9B17-FAE4A213798D}"/>
-              </a:ext>
-            </a:extLst>
-          </p:cNvPr>
-          <p:cNvSpPr txBox="1"/>
-          <p:nvPr/>
-        </p:nvSpPr>
-        <p:spPr>
-          <a:xfrm>
-            <a:off x="942846" y="45783"/>
-            <a:ext cx="332142" cy="338554"/>
-          </a:xfrm>
-          <a:prstGeom prst="rect">
-            <a:avLst/>
-          </a:prstGeom>
-          <a:noFill/>
-        </p:spPr>
-        <p:txBody>
-          <a:bodyPr wrap="none" rtlCol="0">
-            <a:spAutoFit/>
-          </a:bodyPr>
-          <a:lstStyle/>
-          <a:p>
-            <a:r>
-              <a:rPr lang="en-US" sz="1600" b="1" dirty="0">
-                <a:latin typeface="Arial" panose="020B0604020202020204" pitchFamily="34" charset="0"/>
-                <a:cs typeface="Arial" panose="020B0604020202020204" pitchFamily="34" charset="0"/>
-              </a:rPr>
-              <a:t>A</a:t>
-            </a:r>
-          </a:p>
-        </p:txBody>
-      </p:sp>
-      <p:sp>
-        <p:nvSpPr>
-          <p:cNvPr id="11" name="TextBox 10">
-            <a:extLst>
-              <a:ext uri="{FF2B5EF4-FFF2-40B4-BE49-F238E27FC236}">
-                <a16:creationId xmlns:a16="http://schemas.microsoft.com/office/drawing/2014/main" id="{B09DB2BC-B784-F744-91A1-50B789F6BB53}"/>
-              </a:ext>
-            </a:extLst>
-          </p:cNvPr>
-          <p:cNvSpPr txBox="1"/>
-          <p:nvPr/>
-        </p:nvSpPr>
-        <p:spPr>
-          <a:xfrm>
-            <a:off x="3235089" y="45783"/>
-            <a:ext cx="332142" cy="338554"/>
-          </a:xfrm>
-          <a:prstGeom prst="rect">
-            <a:avLst/>
-          </a:prstGeom>
-          <a:noFill/>
-        </p:spPr>
-        <p:txBody>
-          <a:bodyPr wrap="none" rtlCol="0">
-            <a:spAutoFit/>
-          </a:bodyPr>
-          <a:lstStyle/>
-          <a:p>
-            <a:r>
-              <a:rPr lang="en-US" sz="1600" b="1" dirty="0">
-                <a:latin typeface="Arial" panose="020B0604020202020204" pitchFamily="34" charset="0"/>
-                <a:cs typeface="Arial" panose="020B0604020202020204" pitchFamily="34" charset="0"/>
-              </a:rPr>
-              <a:t>B</a:t>
-            </a:r>
-          </a:p>
-        </p:txBody>
-      </p:sp>
-      <p:sp>
-        <p:nvSpPr>
-          <p:cNvPr id="12" name="TextBox 11">
-            <a:extLst>
-              <a:ext uri="{FF2B5EF4-FFF2-40B4-BE49-F238E27FC236}">
-                <a16:creationId xmlns:a16="http://schemas.microsoft.com/office/drawing/2014/main" id="{F014E614-9BBD-9949-88E0-809DF203256D}"/>
-              </a:ext>
-            </a:extLst>
-          </p:cNvPr>
-          <p:cNvSpPr txBox="1"/>
-          <p:nvPr/>
-        </p:nvSpPr>
-        <p:spPr>
-          <a:xfrm>
-            <a:off x="942846" y="2107071"/>
-            <a:ext cx="332142" cy="338554"/>
-          </a:xfrm>
-          <a:prstGeom prst="rect">
-            <a:avLst/>
-          </a:prstGeom>
-          <a:noFill/>
-        </p:spPr>
-        <p:txBody>
-          <a:bodyPr wrap="none" rtlCol="0">
-            <a:spAutoFit/>
-          </a:bodyPr>
-          <a:lstStyle/>
-          <a:p>
-            <a:r>
-              <a:rPr lang="en-US" sz="1600" b="1" dirty="0">
-                <a:latin typeface="Arial" panose="020B0604020202020204" pitchFamily="34" charset="0"/>
-                <a:cs typeface="Arial" panose="020B0604020202020204" pitchFamily="34" charset="0"/>
-              </a:rPr>
-              <a:t>C</a:t>
-            </a:r>
-          </a:p>
-        </p:txBody>
-      </p:sp>
-      <p:sp>
-        <p:nvSpPr>
-          <p:cNvPr id="13" name="TextBox 12">
-            <a:extLst>
-              <a:ext uri="{FF2B5EF4-FFF2-40B4-BE49-F238E27FC236}">
-                <a16:creationId xmlns:a16="http://schemas.microsoft.com/office/drawing/2014/main" id="{919C5676-4D1D-5140-B4B6-FCFBF69C0324}"/>
-              </a:ext>
-            </a:extLst>
-          </p:cNvPr>
-          <p:cNvSpPr txBox="1"/>
-          <p:nvPr/>
-        </p:nvSpPr>
-        <p:spPr>
-          <a:xfrm>
-            <a:off x="3235089" y="2107071"/>
-            <a:ext cx="332142" cy="338554"/>
-          </a:xfrm>
-          <a:prstGeom prst="rect">
-            <a:avLst/>
-          </a:prstGeom>
-          <a:noFill/>
-        </p:spPr>
-        <p:txBody>
-          <a:bodyPr wrap="none" rtlCol="0">
-            <a:spAutoFit/>
-          </a:bodyPr>
-          <a:lstStyle/>
-          <a:p>
-            <a:r>
-              <a:rPr lang="en-US" sz="1600" b="1" dirty="0">
-                <a:latin typeface="Arial" panose="020B0604020202020204" pitchFamily="34" charset="0"/>
-                <a:cs typeface="Arial" panose="020B0604020202020204" pitchFamily="34" charset="0"/>
-              </a:rPr>
-              <a:t>D</a:t>
-            </a:r>
-          </a:p>
-        </p:txBody>
-      </p:sp>
-      <p:sp>
-        <p:nvSpPr>
-          <p:cNvPr id="14" name="Rectangle 13">
-            <a:extLst>
-              <a:ext uri="{FF2B5EF4-FFF2-40B4-BE49-F238E27FC236}">
-                <a16:creationId xmlns:a16="http://schemas.microsoft.com/office/drawing/2014/main" id="{5D78E2B7-555A-CB4F-A738-779A84CCF4DD}"/>
+      <p:sp>
+        <p:nvSpPr>
+          <p:cNvPr id="6" name="Rectangle 5">
+            <a:extLst>
+              <a:ext uri="{FF2B5EF4-FFF2-40B4-BE49-F238E27FC236}">
+                <a16:creationId xmlns:a16="http://schemas.microsoft.com/office/drawing/2014/main" id="{2578A6C7-3444-2B42-BC17-69438B727563}"/>
               </a:ext>
             </a:extLst>
           </p:cNvPr>
@@ -4419,8 +4110,8 @@
         </p:nvSpPr>
         <p:spPr>
           <a:xfrm>
-            <a:off x="5927725" y="371475"/>
-            <a:ext cx="1065029" cy="137160"/>
+            <a:off x="8392458" y="1243132"/>
+            <a:ext cx="2459736" cy="329184"/>
           </a:xfrm>
           <a:prstGeom prst="rect">
             <a:avLst/>
@@ -4461,10 +4152,10 @@
       </p:sp>
       <p:sp>
         <p:nvSpPr>
-          <p:cNvPr id="15" name="Rectangle 14">
-            <a:extLst>
-              <a:ext uri="{FF2B5EF4-FFF2-40B4-BE49-F238E27FC236}">
-                <a16:creationId xmlns:a16="http://schemas.microsoft.com/office/drawing/2014/main" id="{3953DCF0-3ABF-2148-9812-D907442A4436}"/>
+          <p:cNvPr id="7" name="Rectangle 6">
+            <a:extLst>
+              <a:ext uri="{FF2B5EF4-FFF2-40B4-BE49-F238E27FC236}">
+                <a16:creationId xmlns:a16="http://schemas.microsoft.com/office/drawing/2014/main" id="{2B128F79-4291-EE45-9C2F-B72F8AD0642D}"/>
               </a:ext>
             </a:extLst>
           </p:cNvPr>
@@ -4473,14 +4164,14 @@
         </p:nvSpPr>
         <p:spPr>
           <a:xfrm>
-            <a:off x="5988504" y="2368668"/>
-            <a:ext cx="1065029" cy="137160"/>
+            <a:off x="4866132" y="1243132"/>
+            <a:ext cx="2459736" cy="329184"/>
           </a:xfrm>
           <a:prstGeom prst="rect">
             <a:avLst/>
           </a:prstGeom>
           <a:solidFill>
-            <a:srgbClr val="34A352">
+            <a:srgbClr val="746AAE">
               <a:alpha val="40000"/>
             </a:srgbClr>
           </a:solidFill>
@@ -4515,10 +4206,10 @@
       </p:sp>
       <p:sp>
         <p:nvSpPr>
-          <p:cNvPr id="18" name="Rectangle 17">
-            <a:extLst>
-              <a:ext uri="{FF2B5EF4-FFF2-40B4-BE49-F238E27FC236}">
-                <a16:creationId xmlns:a16="http://schemas.microsoft.com/office/drawing/2014/main" id="{AF62702F-7816-B645-9BAC-342F70924B3D}"/>
+          <p:cNvPr id="8" name="Rectangle 7">
+            <a:extLst>
+              <a:ext uri="{FF2B5EF4-FFF2-40B4-BE49-F238E27FC236}">
+                <a16:creationId xmlns:a16="http://schemas.microsoft.com/office/drawing/2014/main" id="{8ABD22FD-0BD1-2E44-9C47-318B2DD11F40}"/>
               </a:ext>
             </a:extLst>
           </p:cNvPr>
@@ -4527,14 +4218,14 @@
         </p:nvSpPr>
         <p:spPr>
           <a:xfrm>
-            <a:off x="4816159" y="371475"/>
-            <a:ext cx="1065029" cy="137160"/>
+            <a:off x="1328790" y="1243132"/>
+            <a:ext cx="2458949" cy="324818"/>
           </a:xfrm>
           <a:prstGeom prst="rect">
             <a:avLst/>
           </a:prstGeom>
           <a:solidFill>
-            <a:srgbClr val="746AAE">
+            <a:srgbClr val="E7540C">
               <a:alpha val="40000"/>
             </a:srgbClr>
           </a:solidFill>
@@ -4567,12 +4258,382 @@
           </a:p>
         </p:txBody>
       </p:sp>
-      <p:sp>
-        <p:nvSpPr>
-          <p:cNvPr id="19" name="Rectangle 18">
-            <a:extLst>
-              <a:ext uri="{FF2B5EF4-FFF2-40B4-BE49-F238E27FC236}">
-                <a16:creationId xmlns:a16="http://schemas.microsoft.com/office/drawing/2014/main" id="{854CAE64-477D-2341-BE39-B48554ABA47B}"/>
+    </p:spTree>
+    <p:extLst>
+      <p:ext uri="{BB962C8B-B14F-4D97-AF65-F5344CB8AC3E}">
+        <p14:creationId xmlns:p14="http://schemas.microsoft.com/office/powerpoint/2010/main" val="431278804"/>
+      </p:ext>
+    </p:extLst>
+  </p:cSld>
+  <p:clrMapOvr>
+    <a:masterClrMapping/>
+  </p:clrMapOvr>
+</p:sld>
+</file>
+
+<file path=ppt/slides/slide3.xml><?xml version="1.0" encoding="utf-8"?>
+<p:sld xmlns:a="http://schemas.openxmlformats.org/drawingml/2006/main" xmlns:r="http://schemas.openxmlformats.org/officeDocument/2006/relationships" xmlns:p="http://schemas.openxmlformats.org/presentationml/2006/main">
+  <p:cSld>
+    <p:spTree>
+      <p:nvGrpSpPr>
+        <p:cNvPr id="1" name=""/>
+        <p:cNvGrpSpPr/>
+        <p:nvPr/>
+      </p:nvGrpSpPr>
+      <p:grpSpPr>
+        <a:xfrm>
+          <a:off x="0" y="0"/>
+          <a:ext cx="0" cy="0"/>
+          <a:chOff x="0" y="0"/>
+          <a:chExt cx="0" cy="0"/>
+        </a:xfrm>
+      </p:grpSpPr>
+      <p:pic>
+        <p:nvPicPr>
+          <p:cNvPr id="32" name="Picture 31" descr="A picture containing clock&#10;&#10;Description automatically generated">
+            <a:extLst>
+              <a:ext uri="{FF2B5EF4-FFF2-40B4-BE49-F238E27FC236}">
+                <a16:creationId xmlns:a16="http://schemas.microsoft.com/office/drawing/2014/main" id="{E6401F7E-2BF0-2F4E-A468-429B64B23DAB}"/>
+              </a:ext>
+            </a:extLst>
+          </p:cNvPr>
+          <p:cNvPicPr>
+            <a:picLocks noChangeAspect="1"/>
+          </p:cNvPicPr>
+          <p:nvPr/>
+        </p:nvPicPr>
+        <p:blipFill>
+          <a:blip r:embed="rId2"/>
+          <a:stretch>
+            <a:fillRect/>
+          </a:stretch>
+        </p:blipFill>
+        <p:spPr>
+          <a:xfrm>
+            <a:off x="3376262" y="332199"/>
+            <a:ext cx="4620122" cy="1491093"/>
+          </a:xfrm>
+          <a:prstGeom prst="rect">
+            <a:avLst/>
+          </a:prstGeom>
+        </p:spPr>
+      </p:pic>
+      <p:pic>
+        <p:nvPicPr>
+          <p:cNvPr id="29" name="Picture 28" descr="A close up of a piece of paper&#10;&#10;Description automatically generated">
+            <a:extLst>
+              <a:ext uri="{FF2B5EF4-FFF2-40B4-BE49-F238E27FC236}">
+                <a16:creationId xmlns:a16="http://schemas.microsoft.com/office/drawing/2014/main" id="{A7A9243F-7992-0343-9958-B779FB3C6B7A}"/>
+              </a:ext>
+            </a:extLst>
+          </p:cNvPr>
+          <p:cNvPicPr>
+            <a:picLocks noChangeAspect="1"/>
+          </p:cNvPicPr>
+          <p:nvPr/>
+        </p:nvPicPr>
+        <p:blipFill>
+          <a:blip r:embed="rId3"/>
+          <a:stretch>
+            <a:fillRect/>
+          </a:stretch>
+        </p:blipFill>
+        <p:spPr>
+          <a:xfrm>
+            <a:off x="1119057" y="2386632"/>
+            <a:ext cx="2096143" cy="1397428"/>
+          </a:xfrm>
+          <a:prstGeom prst="rect">
+            <a:avLst/>
+          </a:prstGeom>
+        </p:spPr>
+      </p:pic>
+      <p:pic>
+        <p:nvPicPr>
+          <p:cNvPr id="28" name="Picture 27" descr="A screenshot of a cell phone&#10;&#10;Description automatically generated">
+            <a:extLst>
+              <a:ext uri="{FF2B5EF4-FFF2-40B4-BE49-F238E27FC236}">
+                <a16:creationId xmlns:a16="http://schemas.microsoft.com/office/drawing/2014/main" id="{B246D3EF-6A04-3E43-973B-8E461A4D29A0}"/>
+              </a:ext>
+            </a:extLst>
+          </p:cNvPr>
+          <p:cNvPicPr>
+            <a:picLocks noChangeAspect="1"/>
+          </p:cNvPicPr>
+          <p:nvPr/>
+        </p:nvPicPr>
+        <p:blipFill>
+          <a:blip r:embed="rId4"/>
+          <a:stretch>
+            <a:fillRect/>
+          </a:stretch>
+        </p:blipFill>
+        <p:spPr>
+          <a:xfrm>
+            <a:off x="3438400" y="2324034"/>
+            <a:ext cx="4620121" cy="1491093"/>
+          </a:xfrm>
+          <a:prstGeom prst="rect">
+            <a:avLst/>
+          </a:prstGeom>
+        </p:spPr>
+      </p:pic>
+      <p:sp>
+        <p:nvSpPr>
+          <p:cNvPr id="4" name="TextBox 3">
+            <a:extLst>
+              <a:ext uri="{FF2B5EF4-FFF2-40B4-BE49-F238E27FC236}">
+                <a16:creationId xmlns:a16="http://schemas.microsoft.com/office/drawing/2014/main" id="{19A58654-40C5-E84F-BFDD-1764935ABB91}"/>
+              </a:ext>
+            </a:extLst>
+          </p:cNvPr>
+          <p:cNvSpPr txBox="1"/>
+          <p:nvPr/>
+        </p:nvSpPr>
+        <p:spPr>
+          <a:xfrm rot="16200000">
+            <a:off x="242182" y="838373"/>
+            <a:ext cx="936475" cy="276999"/>
+          </a:xfrm>
+          <a:prstGeom prst="rect">
+            <a:avLst/>
+          </a:prstGeom>
+          <a:noFill/>
+        </p:spPr>
+        <p:txBody>
+          <a:bodyPr wrap="none" rtlCol="0">
+            <a:spAutoFit/>
+          </a:bodyPr>
+          <a:lstStyle/>
+          <a:p>
+            <a:r>
+              <a:rPr lang="en-US" sz="1200" i="1" dirty="0">
+                <a:latin typeface="Arial" panose="020B0604020202020204" pitchFamily="34" charset="0"/>
+                <a:cs typeface="Arial" panose="020B0604020202020204" pitchFamily="34" charset="0"/>
+              </a:rPr>
+              <a:t>M. </a:t>
+            </a:r>
+            <a:r>
+              <a:rPr lang="en-US" sz="1200" i="1" dirty="0" err="1">
+                <a:latin typeface="Arial" panose="020B0604020202020204" pitchFamily="34" charset="0"/>
+                <a:cs typeface="Arial" panose="020B0604020202020204" pitchFamily="34" charset="0"/>
+              </a:rPr>
+              <a:t>capitata</a:t>
+            </a:r>
+            <a:endParaRPr lang="en-US" sz="1200" i="1" dirty="0">
+              <a:latin typeface="Arial" panose="020B0604020202020204" pitchFamily="34" charset="0"/>
+              <a:cs typeface="Arial" panose="020B0604020202020204" pitchFamily="34" charset="0"/>
+            </a:endParaRPr>
+          </a:p>
+        </p:txBody>
+      </p:sp>
+      <p:sp>
+        <p:nvSpPr>
+          <p:cNvPr id="5" name="TextBox 4">
+            <a:extLst>
+              <a:ext uri="{FF2B5EF4-FFF2-40B4-BE49-F238E27FC236}">
+                <a16:creationId xmlns:a16="http://schemas.microsoft.com/office/drawing/2014/main" id="{1755ACE4-2B09-ED4F-A4A4-DA421FF8BB39}"/>
+              </a:ext>
+            </a:extLst>
+          </p:cNvPr>
+          <p:cNvSpPr txBox="1"/>
+          <p:nvPr/>
+        </p:nvSpPr>
+        <p:spPr>
+          <a:xfrm rot="16200000">
+            <a:off x="345084" y="2894586"/>
+            <a:ext cx="729110" cy="276999"/>
+          </a:xfrm>
+          <a:prstGeom prst="rect">
+            <a:avLst/>
+          </a:prstGeom>
+          <a:noFill/>
+        </p:spPr>
+        <p:txBody>
+          <a:bodyPr wrap="none" rtlCol="0">
+            <a:spAutoFit/>
+          </a:bodyPr>
+          <a:lstStyle/>
+          <a:p>
+            <a:r>
+              <a:rPr lang="en-US" sz="1200" i="1" dirty="0">
+                <a:latin typeface="Arial" panose="020B0604020202020204" pitchFamily="34" charset="0"/>
+                <a:cs typeface="Arial" panose="020B0604020202020204" pitchFamily="34" charset="0"/>
+              </a:rPr>
+              <a:t>P. </a:t>
+            </a:r>
+            <a:r>
+              <a:rPr lang="en-US" sz="1200" i="1" dirty="0" err="1">
+                <a:latin typeface="Arial" panose="020B0604020202020204" pitchFamily="34" charset="0"/>
+                <a:cs typeface="Arial" panose="020B0604020202020204" pitchFamily="34" charset="0"/>
+              </a:rPr>
+              <a:t>acuta</a:t>
+            </a:r>
+            <a:endParaRPr lang="en-US" sz="1200" i="1" dirty="0">
+              <a:latin typeface="Arial" panose="020B0604020202020204" pitchFamily="34" charset="0"/>
+              <a:cs typeface="Arial" panose="020B0604020202020204" pitchFamily="34" charset="0"/>
+            </a:endParaRPr>
+          </a:p>
+        </p:txBody>
+      </p:sp>
+      <p:sp>
+        <p:nvSpPr>
+          <p:cNvPr id="10" name="TextBox 9">
+            <a:extLst>
+              <a:ext uri="{FF2B5EF4-FFF2-40B4-BE49-F238E27FC236}">
+                <a16:creationId xmlns:a16="http://schemas.microsoft.com/office/drawing/2014/main" id="{D7048156-AA6D-9E44-9B17-FAE4A213798D}"/>
+              </a:ext>
+            </a:extLst>
+          </p:cNvPr>
+          <p:cNvSpPr txBox="1"/>
+          <p:nvPr/>
+        </p:nvSpPr>
+        <p:spPr>
+          <a:xfrm>
+            <a:off x="942846" y="45783"/>
+            <a:ext cx="332142" cy="338554"/>
+          </a:xfrm>
+          <a:prstGeom prst="rect">
+            <a:avLst/>
+          </a:prstGeom>
+          <a:noFill/>
+        </p:spPr>
+        <p:txBody>
+          <a:bodyPr wrap="none" rtlCol="0">
+            <a:spAutoFit/>
+          </a:bodyPr>
+          <a:lstStyle/>
+          <a:p>
+            <a:r>
+              <a:rPr lang="en-US" sz="1600" b="1" dirty="0">
+                <a:latin typeface="Arial" panose="020B0604020202020204" pitchFamily="34" charset="0"/>
+                <a:cs typeface="Arial" panose="020B0604020202020204" pitchFamily="34" charset="0"/>
+              </a:rPr>
+              <a:t>A</a:t>
+            </a:r>
+          </a:p>
+        </p:txBody>
+      </p:sp>
+      <p:sp>
+        <p:nvSpPr>
+          <p:cNvPr id="11" name="TextBox 10">
+            <a:extLst>
+              <a:ext uri="{FF2B5EF4-FFF2-40B4-BE49-F238E27FC236}">
+                <a16:creationId xmlns:a16="http://schemas.microsoft.com/office/drawing/2014/main" id="{B09DB2BC-B784-F744-91A1-50B789F6BB53}"/>
+              </a:ext>
+            </a:extLst>
+          </p:cNvPr>
+          <p:cNvSpPr txBox="1"/>
+          <p:nvPr/>
+        </p:nvSpPr>
+        <p:spPr>
+          <a:xfrm>
+            <a:off x="3235089" y="45783"/>
+            <a:ext cx="332142" cy="338554"/>
+          </a:xfrm>
+          <a:prstGeom prst="rect">
+            <a:avLst/>
+          </a:prstGeom>
+          <a:noFill/>
+        </p:spPr>
+        <p:txBody>
+          <a:bodyPr wrap="none" rtlCol="0">
+            <a:spAutoFit/>
+          </a:bodyPr>
+          <a:lstStyle/>
+          <a:p>
+            <a:r>
+              <a:rPr lang="en-US" sz="1600" b="1" dirty="0">
+                <a:latin typeface="Arial" panose="020B0604020202020204" pitchFamily="34" charset="0"/>
+                <a:cs typeface="Arial" panose="020B0604020202020204" pitchFamily="34" charset="0"/>
+              </a:rPr>
+              <a:t>B</a:t>
+            </a:r>
+          </a:p>
+        </p:txBody>
+      </p:sp>
+      <p:sp>
+        <p:nvSpPr>
+          <p:cNvPr id="12" name="TextBox 11">
+            <a:extLst>
+              <a:ext uri="{FF2B5EF4-FFF2-40B4-BE49-F238E27FC236}">
+                <a16:creationId xmlns:a16="http://schemas.microsoft.com/office/drawing/2014/main" id="{F014E614-9BBD-9949-88E0-809DF203256D}"/>
+              </a:ext>
+            </a:extLst>
+          </p:cNvPr>
+          <p:cNvSpPr txBox="1"/>
+          <p:nvPr/>
+        </p:nvSpPr>
+        <p:spPr>
+          <a:xfrm>
+            <a:off x="942846" y="2107071"/>
+            <a:ext cx="332142" cy="338554"/>
+          </a:xfrm>
+          <a:prstGeom prst="rect">
+            <a:avLst/>
+          </a:prstGeom>
+          <a:noFill/>
+        </p:spPr>
+        <p:txBody>
+          <a:bodyPr wrap="none" rtlCol="0">
+            <a:spAutoFit/>
+          </a:bodyPr>
+          <a:lstStyle/>
+          <a:p>
+            <a:r>
+              <a:rPr lang="en-US" sz="1600" b="1" dirty="0">
+                <a:latin typeface="Arial" panose="020B0604020202020204" pitchFamily="34" charset="0"/>
+                <a:cs typeface="Arial" panose="020B0604020202020204" pitchFamily="34" charset="0"/>
+              </a:rPr>
+              <a:t>C</a:t>
+            </a:r>
+          </a:p>
+        </p:txBody>
+      </p:sp>
+      <p:sp>
+        <p:nvSpPr>
+          <p:cNvPr id="13" name="TextBox 12">
+            <a:extLst>
+              <a:ext uri="{FF2B5EF4-FFF2-40B4-BE49-F238E27FC236}">
+                <a16:creationId xmlns:a16="http://schemas.microsoft.com/office/drawing/2014/main" id="{919C5676-4D1D-5140-B4B6-FCFBF69C0324}"/>
+              </a:ext>
+            </a:extLst>
+          </p:cNvPr>
+          <p:cNvSpPr txBox="1"/>
+          <p:nvPr/>
+        </p:nvSpPr>
+        <p:spPr>
+          <a:xfrm>
+            <a:off x="3235089" y="2107071"/>
+            <a:ext cx="332142" cy="338554"/>
+          </a:xfrm>
+          <a:prstGeom prst="rect">
+            <a:avLst/>
+          </a:prstGeom>
+          <a:noFill/>
+        </p:spPr>
+        <p:txBody>
+          <a:bodyPr wrap="none" rtlCol="0">
+            <a:spAutoFit/>
+          </a:bodyPr>
+          <a:lstStyle/>
+          <a:p>
+            <a:r>
+              <a:rPr lang="en-US" sz="1600" b="1" dirty="0">
+                <a:latin typeface="Arial" panose="020B0604020202020204" pitchFamily="34" charset="0"/>
+                <a:cs typeface="Arial" panose="020B0604020202020204" pitchFamily="34" charset="0"/>
+              </a:rPr>
+              <a:t>D</a:t>
+            </a:r>
+          </a:p>
+        </p:txBody>
+      </p:sp>
+      <p:sp>
+        <p:nvSpPr>
+          <p:cNvPr id="14" name="Rectangle 13">
+            <a:extLst>
+              <a:ext uri="{FF2B5EF4-FFF2-40B4-BE49-F238E27FC236}">
+                <a16:creationId xmlns:a16="http://schemas.microsoft.com/office/drawing/2014/main" id="{5D78E2B7-555A-CB4F-A738-779A84CCF4DD}"/>
               </a:ext>
             </a:extLst>
           </p:cNvPr>
@@ -4581,14 +4642,14 @@
         </p:nvSpPr>
         <p:spPr>
           <a:xfrm>
-            <a:off x="4877460" y="2367582"/>
+            <a:off x="5927725" y="371475"/>
             <a:ext cx="1065029" cy="137160"/>
           </a:xfrm>
           <a:prstGeom prst="rect">
             <a:avLst/>
           </a:prstGeom>
           <a:solidFill>
-            <a:srgbClr val="746AAE">
+            <a:srgbClr val="34A352">
               <a:alpha val="40000"/>
             </a:srgbClr>
           </a:solidFill>
@@ -4623,10 +4684,10 @@
       </p:sp>
       <p:sp>
         <p:nvSpPr>
-          <p:cNvPr id="21" name="Rectangle 20">
-            <a:extLst>
-              <a:ext uri="{FF2B5EF4-FFF2-40B4-BE49-F238E27FC236}">
-                <a16:creationId xmlns:a16="http://schemas.microsoft.com/office/drawing/2014/main" id="{795AA10E-C231-884D-847B-18DEA59B2842}"/>
+          <p:cNvPr id="15" name="Rectangle 14">
+            <a:extLst>
+              <a:ext uri="{FF2B5EF4-FFF2-40B4-BE49-F238E27FC236}">
+                <a16:creationId xmlns:a16="http://schemas.microsoft.com/office/drawing/2014/main" id="{3953DCF0-3ABF-2148-9812-D907442A4436}"/>
               </a:ext>
             </a:extLst>
           </p:cNvPr>
@@ -4635,14 +4696,14 @@
         </p:nvSpPr>
         <p:spPr>
           <a:xfrm>
-            <a:off x="3705197" y="372218"/>
+            <a:off x="5988504" y="2368668"/>
             <a:ext cx="1065029" cy="137160"/>
           </a:xfrm>
           <a:prstGeom prst="rect">
             <a:avLst/>
           </a:prstGeom>
           <a:solidFill>
-            <a:srgbClr val="E7540C">
+            <a:srgbClr val="34A352">
               <a:alpha val="40000"/>
             </a:srgbClr>
           </a:solidFill>
@@ -4677,10 +4738,10 @@
       </p:sp>
       <p:sp>
         <p:nvSpPr>
-          <p:cNvPr id="22" name="Rectangle 21">
-            <a:extLst>
-              <a:ext uri="{FF2B5EF4-FFF2-40B4-BE49-F238E27FC236}">
-                <a16:creationId xmlns:a16="http://schemas.microsoft.com/office/drawing/2014/main" id="{4112CB69-60CC-B24A-B5CB-6EA88A230B0E}"/>
+          <p:cNvPr id="18" name="Rectangle 17">
+            <a:extLst>
+              <a:ext uri="{FF2B5EF4-FFF2-40B4-BE49-F238E27FC236}">
+                <a16:creationId xmlns:a16="http://schemas.microsoft.com/office/drawing/2014/main" id="{AF62702F-7816-B645-9BAC-342F70924B3D}"/>
               </a:ext>
             </a:extLst>
           </p:cNvPr>
@@ -4689,14 +4750,14 @@
         </p:nvSpPr>
         <p:spPr>
           <a:xfrm>
-            <a:off x="3766209" y="2367582"/>
+            <a:off x="4816159" y="371475"/>
             <a:ext cx="1065029" cy="137160"/>
           </a:xfrm>
           <a:prstGeom prst="rect">
             <a:avLst/>
           </a:prstGeom>
           <a:solidFill>
-            <a:srgbClr val="E7540C">
+            <a:srgbClr val="746AAE">
               <a:alpha val="40000"/>
             </a:srgbClr>
           </a:solidFill>
@@ -4729,6 +4790,168 @@
           </a:p>
         </p:txBody>
       </p:sp>
+      <p:sp>
+        <p:nvSpPr>
+          <p:cNvPr id="19" name="Rectangle 18">
+            <a:extLst>
+              <a:ext uri="{FF2B5EF4-FFF2-40B4-BE49-F238E27FC236}">
+                <a16:creationId xmlns:a16="http://schemas.microsoft.com/office/drawing/2014/main" id="{854CAE64-477D-2341-BE39-B48554ABA47B}"/>
+              </a:ext>
+            </a:extLst>
+          </p:cNvPr>
+          <p:cNvSpPr/>
+          <p:nvPr/>
+        </p:nvSpPr>
+        <p:spPr>
+          <a:xfrm>
+            <a:off x="4877460" y="2367582"/>
+            <a:ext cx="1065029" cy="137160"/>
+          </a:xfrm>
+          <a:prstGeom prst="rect">
+            <a:avLst/>
+          </a:prstGeom>
+          <a:solidFill>
+            <a:srgbClr val="746AAE">
+              <a:alpha val="40000"/>
+            </a:srgbClr>
+          </a:solidFill>
+          <a:ln>
+            <a:noFill/>
+          </a:ln>
+        </p:spPr>
+        <p:style>
+          <a:lnRef idx="2">
+            <a:schemeClr val="accent1">
+              <a:shade val="50000"/>
+            </a:schemeClr>
+          </a:lnRef>
+          <a:fillRef idx="1">
+            <a:schemeClr val="accent1"/>
+          </a:fillRef>
+          <a:effectRef idx="0">
+            <a:schemeClr val="accent1"/>
+          </a:effectRef>
+          <a:fontRef idx="minor">
+            <a:schemeClr val="lt1"/>
+          </a:fontRef>
+        </p:style>
+        <p:txBody>
+          <a:bodyPr rtlCol="0" anchor="ctr"/>
+          <a:lstStyle/>
+          <a:p>
+            <a:pPr algn="ctr"/>
+            <a:endParaRPr lang="en-US"/>
+          </a:p>
+        </p:txBody>
+      </p:sp>
+      <p:sp>
+        <p:nvSpPr>
+          <p:cNvPr id="21" name="Rectangle 20">
+            <a:extLst>
+              <a:ext uri="{FF2B5EF4-FFF2-40B4-BE49-F238E27FC236}">
+                <a16:creationId xmlns:a16="http://schemas.microsoft.com/office/drawing/2014/main" id="{795AA10E-C231-884D-847B-18DEA59B2842}"/>
+              </a:ext>
+            </a:extLst>
+          </p:cNvPr>
+          <p:cNvSpPr/>
+          <p:nvPr/>
+        </p:nvSpPr>
+        <p:spPr>
+          <a:xfrm>
+            <a:off x="3705197" y="372218"/>
+            <a:ext cx="1065029" cy="137160"/>
+          </a:xfrm>
+          <a:prstGeom prst="rect">
+            <a:avLst/>
+          </a:prstGeom>
+          <a:solidFill>
+            <a:srgbClr val="E7540C">
+              <a:alpha val="40000"/>
+            </a:srgbClr>
+          </a:solidFill>
+          <a:ln>
+            <a:noFill/>
+          </a:ln>
+        </p:spPr>
+        <p:style>
+          <a:lnRef idx="2">
+            <a:schemeClr val="accent1">
+              <a:shade val="50000"/>
+            </a:schemeClr>
+          </a:lnRef>
+          <a:fillRef idx="1">
+            <a:schemeClr val="accent1"/>
+          </a:fillRef>
+          <a:effectRef idx="0">
+            <a:schemeClr val="accent1"/>
+          </a:effectRef>
+          <a:fontRef idx="minor">
+            <a:schemeClr val="lt1"/>
+          </a:fontRef>
+        </p:style>
+        <p:txBody>
+          <a:bodyPr rtlCol="0" anchor="ctr"/>
+          <a:lstStyle/>
+          <a:p>
+            <a:pPr algn="ctr"/>
+            <a:endParaRPr lang="en-US"/>
+          </a:p>
+        </p:txBody>
+      </p:sp>
+      <p:sp>
+        <p:nvSpPr>
+          <p:cNvPr id="22" name="Rectangle 21">
+            <a:extLst>
+              <a:ext uri="{FF2B5EF4-FFF2-40B4-BE49-F238E27FC236}">
+                <a16:creationId xmlns:a16="http://schemas.microsoft.com/office/drawing/2014/main" id="{4112CB69-60CC-B24A-B5CB-6EA88A230B0E}"/>
+              </a:ext>
+            </a:extLst>
+          </p:cNvPr>
+          <p:cNvSpPr/>
+          <p:nvPr/>
+        </p:nvSpPr>
+        <p:spPr>
+          <a:xfrm>
+            <a:off x="3766209" y="2367582"/>
+            <a:ext cx="1065029" cy="137160"/>
+          </a:xfrm>
+          <a:prstGeom prst="rect">
+            <a:avLst/>
+          </a:prstGeom>
+          <a:solidFill>
+            <a:srgbClr val="E7540C">
+              <a:alpha val="40000"/>
+            </a:srgbClr>
+          </a:solidFill>
+          <a:ln>
+            <a:noFill/>
+          </a:ln>
+        </p:spPr>
+        <p:style>
+          <a:lnRef idx="2">
+            <a:schemeClr val="accent1">
+              <a:shade val="50000"/>
+            </a:schemeClr>
+          </a:lnRef>
+          <a:fillRef idx="1">
+            <a:schemeClr val="accent1"/>
+          </a:fillRef>
+          <a:effectRef idx="0">
+            <a:schemeClr val="accent1"/>
+          </a:effectRef>
+          <a:fontRef idx="minor">
+            <a:schemeClr val="lt1"/>
+          </a:fontRef>
+        </p:style>
+        <p:txBody>
+          <a:bodyPr rtlCol="0" anchor="ctr"/>
+          <a:lstStyle/>
+          <a:p>
+            <a:pPr algn="ctr"/>
+            <a:endParaRPr lang="en-US"/>
+          </a:p>
+        </p:txBody>
+      </p:sp>
       <p:pic>
         <p:nvPicPr>
           <p:cNvPr id="30" name="Picture 29" descr="A close up of a piece of paper&#10;&#10;Description automatically generated">
@@ -4772,7 +4995,7 @@
 </p:sld>
 </file>
 
-<file path=ppt/slides/slide3.xml><?xml version="1.0" encoding="utf-8"?>
+<file path=ppt/slides/slide4.xml><?xml version="1.0" encoding="utf-8"?>
 <p:sld xmlns:a="http://schemas.openxmlformats.org/drawingml/2006/main" xmlns:r="http://schemas.openxmlformats.org/officeDocument/2006/relationships" xmlns:p="http://schemas.openxmlformats.org/presentationml/2006/main" show="0">
   <p:cSld>
     <p:spTree>
@@ -5014,7 +5237,7 @@
 </p:sld>
 </file>
 
-<file path=ppt/slides/slide4.xml><?xml version="1.0" encoding="utf-8"?>
+<file path=ppt/slides/slide5.xml><?xml version="1.0" encoding="utf-8"?>
 <p:sld xmlns:a="http://schemas.openxmlformats.org/drawingml/2006/main" xmlns:r="http://schemas.openxmlformats.org/officeDocument/2006/relationships" xmlns:p="http://schemas.openxmlformats.org/presentationml/2006/main">
   <p:cSld>
     <p:spTree>
@@ -5150,7 +5373,7 @@
 </p:sld>
 </file>
 
-<file path=ppt/slides/slide5.xml><?xml version="1.0" encoding="utf-8"?>
+<file path=ppt/slides/slide6.xml><?xml version="1.0" encoding="utf-8"?>
 <p:sld xmlns:a="http://schemas.openxmlformats.org/drawingml/2006/main" xmlns:r="http://schemas.openxmlformats.org/officeDocument/2006/relationships" xmlns:p="http://schemas.openxmlformats.org/presentationml/2006/main">
   <p:cSld>
     <p:spTree>

</xml_diff>